<commit_message>
tambah timeline di ppt
</commit_message>
<xml_diff>
--- a/MELAYANG.pptx
+++ b/MELAYANG.pptx
@@ -12,9 +12,10 @@
     <p:sldId id="258" r:id="rId6"/>
     <p:sldId id="261" r:id="rId7"/>
     <p:sldId id="260" r:id="rId8"/>
-    <p:sldId id="262" r:id="rId9"/>
-    <p:sldId id="263" r:id="rId10"/>
-    <p:sldId id="264" r:id="rId11"/>
+    <p:sldId id="266" r:id="rId9"/>
+    <p:sldId id="262" r:id="rId10"/>
+    <p:sldId id="263" r:id="rId11"/>
+    <p:sldId id="264" r:id="rId12"/>
   </p:sldIdLst>
   <p:sldSz cx="12192000" cy="6858000"/>
   <p:notesSz cx="6858000" cy="9144000"/>
@@ -113,6 +114,11 @@
       </a:defRPr>
     </a:lvl9pPr>
   </p:defaultTextStyle>
+  <p:extLst>
+    <p:ext uri="{EFAFB233-063F-42B5-8137-9DF3F51BA10A}">
+      <p15:sldGuideLst xmlns:p15="http://schemas.microsoft.com/office/powerpoint/2012/main"/>
+    </p:ext>
+  </p:extLst>
 </p:presentation>
 </file>
 
@@ -3045,10 +3051,6 @@
               </a:rPr>
               <a:t>I Made Aditya P. M.		(5112100184)</a:t>
             </a:r>
-            <a:endParaRPr lang="en-US" b="1" dirty="0" smtClean="0">
-              <a:latin typeface="Arial" panose="020B0604020202020204" pitchFamily="34" charset="0"/>
-              <a:cs typeface="Arial" panose="020B0604020202020204" pitchFamily="34" charset="0"/>
-            </a:endParaRPr>
           </a:p>
           <a:p>
             <a:r>
@@ -3320,6 +3322,2056 @@
 </file>
 
 <file path=ppt/slides/slide10.xml><?xml version="1.0" encoding="utf-8"?>
+<p:sld xmlns:a="http://schemas.openxmlformats.org/drawingml/2006/main" xmlns:r="http://schemas.openxmlformats.org/officeDocument/2006/relationships" xmlns:p="http://schemas.openxmlformats.org/presentationml/2006/main">
+  <p:cSld>
+    <p:bg>
+      <p:bgPr>
+        <a:solidFill>
+          <a:srgbClr val="FBFBFB"/>
+        </a:solidFill>
+        <a:effectLst/>
+      </p:bgPr>
+    </p:bg>
+    <p:spTree>
+      <p:nvGrpSpPr>
+        <p:cNvPr id="1" name=""/>
+        <p:cNvGrpSpPr/>
+        <p:nvPr/>
+      </p:nvGrpSpPr>
+      <p:grpSpPr>
+        <a:xfrm>
+          <a:off x="0" y="0"/>
+          <a:ext cx="0" cy="0"/>
+          <a:chOff x="0" y="0"/>
+          <a:chExt cx="0" cy="0"/>
+        </a:xfrm>
+      </p:grpSpPr>
+      <p:sp>
+        <p:nvSpPr>
+          <p:cNvPr id="2" name="Title 1"/>
+          <p:cNvSpPr>
+            <a:spLocks noGrp="1"/>
+          </p:cNvSpPr>
+          <p:nvPr>
+            <p:ph type="title"/>
+          </p:nvPr>
+        </p:nvSpPr>
+        <p:spPr>
+          <a:xfrm>
+            <a:off x="838200" y="365125"/>
+            <a:ext cx="4738352" cy="1325563"/>
+          </a:xfrm>
+        </p:spPr>
+        <p:txBody>
+          <a:bodyPr/>
+          <a:lstStyle/>
+          <a:p>
+            <a:r>
+              <a:rPr lang="en-US" dirty="0" smtClean="0">
+                <a:solidFill>
+                  <a:srgbClr val="E9410D"/>
+                </a:solidFill>
+                <a:latin typeface="Arial" panose="020B0604020202020204" pitchFamily="34" charset="0"/>
+                <a:cs typeface="Arial" panose="020B0604020202020204" pitchFamily="34" charset="0"/>
+              </a:rPr>
+              <a:t>RISIKO</a:t>
+            </a:r>
+            <a:endParaRPr lang="en-US" dirty="0">
+              <a:solidFill>
+                <a:srgbClr val="E9410D"/>
+              </a:solidFill>
+              <a:latin typeface="Arial" panose="020B0604020202020204" pitchFamily="34" charset="0"/>
+              <a:cs typeface="Arial" panose="020B0604020202020204" pitchFamily="34" charset="0"/>
+            </a:endParaRPr>
+          </a:p>
+        </p:txBody>
+      </p:sp>
+      <p:sp>
+        <p:nvSpPr>
+          <p:cNvPr id="4" name="Isosceles Triangle 3"/>
+          <p:cNvSpPr/>
+          <p:nvPr/>
+        </p:nvSpPr>
+        <p:spPr>
+          <a:xfrm rot="5400000">
+            <a:off x="-70835" y="32199"/>
+            <a:ext cx="1081828" cy="965916"/>
+          </a:xfrm>
+          <a:prstGeom prst="triangle">
+            <a:avLst>
+              <a:gd name="adj" fmla="val 0"/>
+            </a:avLst>
+          </a:prstGeom>
+          <a:solidFill>
+            <a:srgbClr val="E9410D"/>
+          </a:solidFill>
+          <a:ln>
+            <a:noFill/>
+          </a:ln>
+        </p:spPr>
+        <p:style>
+          <a:lnRef idx="2">
+            <a:schemeClr val="accent1">
+              <a:shade val="50000"/>
+            </a:schemeClr>
+          </a:lnRef>
+          <a:fillRef idx="1">
+            <a:schemeClr val="accent1"/>
+          </a:fillRef>
+          <a:effectRef idx="0">
+            <a:schemeClr val="accent1"/>
+          </a:effectRef>
+          <a:fontRef idx="minor">
+            <a:schemeClr val="lt1"/>
+          </a:fontRef>
+        </p:style>
+        <p:txBody>
+          <a:bodyPr rtlCol="0" anchor="ctr"/>
+          <a:lstStyle/>
+          <a:p>
+            <a:pPr algn="ctr"/>
+            <a:endParaRPr lang="en-US"/>
+          </a:p>
+        </p:txBody>
+      </p:sp>
+      <p:graphicFrame>
+        <p:nvGraphicFramePr>
+          <p:cNvPr id="3" name="Table 2"/>
+          <p:cNvGraphicFramePr>
+            <a:graphicFrameLocks noGrp="1"/>
+          </p:cNvGraphicFramePr>
+          <p:nvPr>
+            <p:extLst>
+              <p:ext uri="{D42A27DB-BD31-4B8C-83A1-F6EECF244321}">
+                <p14:modId xmlns:p14="http://schemas.microsoft.com/office/powerpoint/2010/main" val="2292707057"/>
+              </p:ext>
+            </p:extLst>
+          </p:nvPr>
+        </p:nvGraphicFramePr>
+        <p:xfrm>
+          <a:off x="1345585" y="1553028"/>
+          <a:ext cx="10686758" cy="5138058"/>
+        </p:xfrm>
+        <a:graphic>
+          <a:graphicData uri="http://schemas.openxmlformats.org/drawingml/2006/table">
+            <a:tbl>
+              <a:tblPr firstRow="1" bandRow="1">
+                <a:tableStyleId>{21E4AEA4-8DFA-4A89-87EB-49C32662AFE0}</a:tableStyleId>
+              </a:tblPr>
+              <a:tblGrid>
+                <a:gridCol w="2792719"/>
+                <a:gridCol w="7894039"/>
+              </a:tblGrid>
+              <a:tr h="331413">
+                <a:tc>
+                  <a:txBody>
+                    <a:bodyPr/>
+                    <a:lstStyle/>
+                    <a:p>
+                      <a:pPr algn="ctr"/>
+                      <a:r>
+                        <a:rPr lang="en-US" sz="2400" dirty="0" smtClean="0"/>
+                        <a:t>JENIS RISIKO</a:t>
+                      </a:r>
+                      <a:endParaRPr lang="en-US" sz="2400" dirty="0"/>
+                    </a:p>
+                  </a:txBody>
+                  <a:tcPr/>
+                </a:tc>
+                <a:tc>
+                  <a:txBody>
+                    <a:bodyPr/>
+                    <a:lstStyle/>
+                    <a:p>
+                      <a:pPr algn="ctr"/>
+                      <a:r>
+                        <a:rPr lang="en-US" sz="2400" dirty="0" smtClean="0"/>
+                        <a:t>DETAIL</a:t>
+                      </a:r>
+                      <a:endParaRPr lang="en-US" sz="2400" dirty="0"/>
+                    </a:p>
+                  </a:txBody>
+                  <a:tcPr/>
+                </a:tc>
+              </a:tr>
+              <a:tr h="986873">
+                <a:tc>
+                  <a:txBody>
+                    <a:bodyPr/>
+                    <a:lstStyle/>
+                    <a:p>
+                      <a:r>
+                        <a:rPr lang="en-US" dirty="0" err="1" smtClean="0"/>
+                        <a:t>Risiko</a:t>
+                      </a:r>
+                      <a:r>
+                        <a:rPr lang="en-US" baseline="0" dirty="0" smtClean="0"/>
+                        <a:t> </a:t>
+                      </a:r>
+                      <a:r>
+                        <a:rPr lang="en-US" baseline="0" dirty="0" err="1" smtClean="0"/>
+                        <a:t>Kontraktual</a:t>
+                      </a:r>
+                      <a:endParaRPr lang="en-US" baseline="0" dirty="0" smtClean="0"/>
+                    </a:p>
+                  </a:txBody>
+                  <a:tcPr/>
+                </a:tc>
+                <a:tc>
+                  <a:txBody>
+                    <a:bodyPr/>
+                    <a:lstStyle/>
+                    <a:p>
+                      <a:pPr marL="406400" lvl="2" indent="-342900" algn="l">
+                        <a:buAutoNum type="arabicPeriod"/>
+                      </a:pPr>
+                      <a:r>
+                        <a:rPr lang="en-GB" sz="1800" kern="1200" dirty="0" err="1" smtClean="0">
+                          <a:solidFill>
+                            <a:schemeClr val="dk1"/>
+                          </a:solidFill>
+                          <a:effectLst/>
+                          <a:latin typeface="+mn-lt"/>
+                          <a:ea typeface="+mn-ea"/>
+                          <a:cs typeface="+mn-cs"/>
+                        </a:rPr>
+                        <a:t>Kebutuhan</a:t>
+                      </a:r>
+                      <a:r>
+                        <a:rPr lang="en-GB" sz="1800" kern="1200" dirty="0" smtClean="0">
+                          <a:solidFill>
+                            <a:schemeClr val="dk1"/>
+                          </a:solidFill>
+                          <a:effectLst/>
+                          <a:latin typeface="+mn-lt"/>
+                          <a:ea typeface="+mn-ea"/>
+                          <a:cs typeface="+mn-cs"/>
+                        </a:rPr>
+                        <a:t> </a:t>
+                      </a:r>
+                      <a:r>
+                        <a:rPr lang="en-GB" sz="1800" kern="1200" dirty="0" err="1" smtClean="0">
+                          <a:solidFill>
+                            <a:schemeClr val="dk1"/>
+                          </a:solidFill>
+                          <a:effectLst/>
+                          <a:latin typeface="+mn-lt"/>
+                          <a:ea typeface="+mn-ea"/>
+                          <a:cs typeface="+mn-cs"/>
+                        </a:rPr>
+                        <a:t>pelanggan</a:t>
+                      </a:r>
+                      <a:r>
+                        <a:rPr lang="en-GB" sz="1800" kern="1200" dirty="0" smtClean="0">
+                          <a:solidFill>
+                            <a:schemeClr val="dk1"/>
+                          </a:solidFill>
+                          <a:effectLst/>
+                          <a:latin typeface="+mn-lt"/>
+                          <a:ea typeface="+mn-ea"/>
+                          <a:cs typeface="+mn-cs"/>
+                        </a:rPr>
+                        <a:t> yang </a:t>
+                      </a:r>
+                      <a:r>
+                        <a:rPr lang="en-GB" sz="1800" kern="1200" dirty="0" err="1" smtClean="0">
+                          <a:solidFill>
+                            <a:schemeClr val="dk1"/>
+                          </a:solidFill>
+                          <a:effectLst/>
+                          <a:latin typeface="+mn-lt"/>
+                          <a:ea typeface="+mn-ea"/>
+                          <a:cs typeface="+mn-cs"/>
+                        </a:rPr>
+                        <a:t>berubah</a:t>
+                      </a:r>
+                      <a:r>
+                        <a:rPr lang="en-GB" sz="1800" kern="1200" dirty="0" smtClean="0">
+                          <a:solidFill>
+                            <a:schemeClr val="dk1"/>
+                          </a:solidFill>
+                          <a:effectLst/>
+                          <a:latin typeface="+mn-lt"/>
+                          <a:ea typeface="+mn-ea"/>
+                          <a:cs typeface="+mn-cs"/>
+                        </a:rPr>
+                        <a:t> / </a:t>
+                      </a:r>
+                      <a:r>
+                        <a:rPr lang="en-GB" sz="1800" kern="1200" dirty="0" err="1" smtClean="0">
+                          <a:solidFill>
+                            <a:schemeClr val="dk1"/>
+                          </a:solidFill>
+                          <a:effectLst/>
+                          <a:latin typeface="+mn-lt"/>
+                          <a:ea typeface="+mn-ea"/>
+                          <a:cs typeface="+mn-cs"/>
+                        </a:rPr>
+                        <a:t>bertambah</a:t>
+                      </a:r>
+                      <a:r>
+                        <a:rPr lang="en-GB" sz="1800" kern="1200" dirty="0" smtClean="0">
+                          <a:solidFill>
+                            <a:schemeClr val="dk1"/>
+                          </a:solidFill>
+                          <a:effectLst/>
+                          <a:latin typeface="+mn-lt"/>
+                          <a:ea typeface="+mn-ea"/>
+                          <a:cs typeface="+mn-cs"/>
+                        </a:rPr>
+                        <a:t>, yang </a:t>
+                      </a:r>
+                      <a:r>
+                        <a:rPr lang="en-GB" sz="1800" kern="1200" dirty="0" err="1" smtClean="0">
+                          <a:solidFill>
+                            <a:schemeClr val="dk1"/>
+                          </a:solidFill>
+                          <a:effectLst/>
+                          <a:latin typeface="+mn-lt"/>
+                          <a:ea typeface="+mn-ea"/>
+                          <a:cs typeface="+mn-cs"/>
+                        </a:rPr>
+                        <a:t>mempengaruhi</a:t>
+                      </a:r>
+                      <a:r>
+                        <a:rPr lang="en-GB" sz="1800" kern="1200" dirty="0" smtClean="0">
+                          <a:solidFill>
+                            <a:schemeClr val="dk1"/>
+                          </a:solidFill>
+                          <a:effectLst/>
+                          <a:latin typeface="+mn-lt"/>
+                          <a:ea typeface="+mn-ea"/>
+                          <a:cs typeface="+mn-cs"/>
+                        </a:rPr>
+                        <a:t> </a:t>
+                      </a:r>
+                      <a:r>
+                        <a:rPr lang="en-GB" sz="1800" kern="1200" dirty="0" err="1" smtClean="0">
+                          <a:solidFill>
+                            <a:schemeClr val="dk1"/>
+                          </a:solidFill>
+                          <a:effectLst/>
+                          <a:latin typeface="+mn-lt"/>
+                          <a:ea typeface="+mn-ea"/>
+                          <a:cs typeface="+mn-cs"/>
+                        </a:rPr>
+                        <a:t>pengembangan</a:t>
+                      </a:r>
+                      <a:r>
+                        <a:rPr lang="en-GB" sz="1800" kern="1200" dirty="0" smtClean="0">
+                          <a:solidFill>
+                            <a:schemeClr val="dk1"/>
+                          </a:solidFill>
+                          <a:effectLst/>
+                          <a:latin typeface="+mn-lt"/>
+                          <a:ea typeface="+mn-ea"/>
+                          <a:cs typeface="+mn-cs"/>
+                        </a:rPr>
+                        <a:t> </a:t>
+                      </a:r>
+                      <a:r>
+                        <a:rPr lang="en-GB" sz="1800" kern="1200" dirty="0" err="1" smtClean="0">
+                          <a:solidFill>
+                            <a:schemeClr val="dk1"/>
+                          </a:solidFill>
+                          <a:effectLst/>
+                          <a:latin typeface="+mn-lt"/>
+                          <a:ea typeface="+mn-ea"/>
+                          <a:cs typeface="+mn-cs"/>
+                        </a:rPr>
+                        <a:t>perangkat</a:t>
+                      </a:r>
+                      <a:r>
+                        <a:rPr lang="en-GB" sz="1800" kern="1200" dirty="0" smtClean="0">
+                          <a:solidFill>
+                            <a:schemeClr val="dk1"/>
+                          </a:solidFill>
+                          <a:effectLst/>
+                          <a:latin typeface="+mn-lt"/>
+                          <a:ea typeface="+mn-ea"/>
+                          <a:cs typeface="+mn-cs"/>
+                        </a:rPr>
+                        <a:t> </a:t>
+                      </a:r>
+                      <a:r>
+                        <a:rPr lang="en-GB" sz="1800" kern="1200" dirty="0" err="1" smtClean="0">
+                          <a:solidFill>
+                            <a:schemeClr val="dk1"/>
+                          </a:solidFill>
+                          <a:effectLst/>
+                          <a:latin typeface="+mn-lt"/>
+                          <a:ea typeface="+mn-ea"/>
+                          <a:cs typeface="+mn-cs"/>
+                        </a:rPr>
+                        <a:t>lunak</a:t>
+                      </a:r>
+                      <a:r>
+                        <a:rPr lang="en-GB" sz="1800" kern="1200" dirty="0" smtClean="0">
+                          <a:solidFill>
+                            <a:schemeClr val="dk1"/>
+                          </a:solidFill>
+                          <a:effectLst/>
+                          <a:latin typeface="+mn-lt"/>
+                          <a:ea typeface="+mn-ea"/>
+                          <a:cs typeface="+mn-cs"/>
+                        </a:rPr>
+                        <a:t>.</a:t>
+                      </a:r>
+                      <a:endParaRPr lang="en-US" sz="1200" kern="1200" dirty="0" smtClean="0">
+                        <a:solidFill>
+                          <a:schemeClr val="dk1"/>
+                        </a:solidFill>
+                        <a:effectLst/>
+                        <a:latin typeface="+mn-lt"/>
+                        <a:ea typeface="+mn-ea"/>
+                        <a:cs typeface="+mn-cs"/>
+                      </a:endParaRPr>
+                    </a:p>
+                    <a:p>
+                      <a:pPr marL="406400" lvl="2" indent="-342900" algn="l">
+                        <a:buAutoNum type="arabicPeriod"/>
+                      </a:pPr>
+                      <a:r>
+                        <a:rPr lang="en-GB" sz="1800" kern="1200" dirty="0" err="1" smtClean="0">
+                          <a:solidFill>
+                            <a:schemeClr val="dk1"/>
+                          </a:solidFill>
+                          <a:effectLst/>
+                          <a:latin typeface="+mn-lt"/>
+                          <a:ea typeface="+mn-ea"/>
+                          <a:cs typeface="+mn-cs"/>
+                        </a:rPr>
+                        <a:t>Spesifikasi</a:t>
+                      </a:r>
+                      <a:r>
+                        <a:rPr lang="en-GB" sz="1800" kern="1200" dirty="0" smtClean="0">
+                          <a:solidFill>
+                            <a:schemeClr val="dk1"/>
+                          </a:solidFill>
+                          <a:effectLst/>
+                          <a:latin typeface="+mn-lt"/>
+                          <a:ea typeface="+mn-ea"/>
+                          <a:cs typeface="+mn-cs"/>
+                        </a:rPr>
+                        <a:t> </a:t>
+                      </a:r>
+                      <a:r>
+                        <a:rPr lang="en-GB" sz="1800" kern="1200" dirty="0" err="1" smtClean="0">
+                          <a:solidFill>
+                            <a:schemeClr val="dk1"/>
+                          </a:solidFill>
+                          <a:effectLst/>
+                          <a:latin typeface="+mn-lt"/>
+                          <a:ea typeface="+mn-ea"/>
+                          <a:cs typeface="+mn-cs"/>
+                        </a:rPr>
+                        <a:t>persyaratan</a:t>
+                      </a:r>
+                      <a:r>
+                        <a:rPr lang="en-GB" sz="1800" kern="1200" dirty="0" smtClean="0">
+                          <a:solidFill>
+                            <a:schemeClr val="dk1"/>
+                          </a:solidFill>
+                          <a:effectLst/>
+                          <a:latin typeface="+mn-lt"/>
+                          <a:ea typeface="+mn-ea"/>
+                          <a:cs typeface="+mn-cs"/>
+                        </a:rPr>
+                        <a:t> </a:t>
+                      </a:r>
+                      <a:r>
+                        <a:rPr lang="en-GB" sz="1800" kern="1200" dirty="0" err="1" smtClean="0">
+                          <a:solidFill>
+                            <a:schemeClr val="dk1"/>
+                          </a:solidFill>
+                          <a:effectLst/>
+                          <a:latin typeface="+mn-lt"/>
+                          <a:ea typeface="+mn-ea"/>
+                          <a:cs typeface="+mn-cs"/>
+                        </a:rPr>
+                        <a:t>pelanggan</a:t>
+                      </a:r>
+                      <a:r>
+                        <a:rPr lang="en-GB" sz="1800" kern="1200" dirty="0" smtClean="0">
+                          <a:solidFill>
+                            <a:schemeClr val="dk1"/>
+                          </a:solidFill>
+                          <a:effectLst/>
+                          <a:latin typeface="+mn-lt"/>
+                          <a:ea typeface="+mn-ea"/>
+                          <a:cs typeface="+mn-cs"/>
+                        </a:rPr>
+                        <a:t> </a:t>
+                      </a:r>
+                      <a:r>
+                        <a:rPr lang="en-GB" sz="1800" kern="1200" dirty="0" err="1" smtClean="0">
+                          <a:solidFill>
+                            <a:schemeClr val="dk1"/>
+                          </a:solidFill>
+                          <a:effectLst/>
+                          <a:latin typeface="+mn-lt"/>
+                          <a:ea typeface="+mn-ea"/>
+                          <a:cs typeface="+mn-cs"/>
+                        </a:rPr>
+                        <a:t>kurang</a:t>
+                      </a:r>
+                      <a:r>
+                        <a:rPr lang="en-GB" sz="1800" kern="1200" dirty="0" smtClean="0">
+                          <a:solidFill>
+                            <a:schemeClr val="dk1"/>
+                          </a:solidFill>
+                          <a:effectLst/>
+                          <a:latin typeface="+mn-lt"/>
+                          <a:ea typeface="+mn-ea"/>
+                          <a:cs typeface="+mn-cs"/>
+                        </a:rPr>
+                        <a:t> </a:t>
+                      </a:r>
+                      <a:r>
+                        <a:rPr lang="en-GB" sz="1800" kern="1200" dirty="0" err="1" smtClean="0">
+                          <a:solidFill>
+                            <a:schemeClr val="dk1"/>
+                          </a:solidFill>
+                          <a:effectLst/>
+                          <a:latin typeface="+mn-lt"/>
+                          <a:ea typeface="+mn-ea"/>
+                          <a:cs typeface="+mn-cs"/>
+                        </a:rPr>
+                        <a:t>jelas</a:t>
+                      </a:r>
+                      <a:r>
+                        <a:rPr lang="en-GB" sz="1800" kern="1200" dirty="0" smtClean="0">
+                          <a:solidFill>
+                            <a:schemeClr val="dk1"/>
+                          </a:solidFill>
+                          <a:effectLst/>
+                          <a:latin typeface="+mn-lt"/>
+                          <a:ea typeface="+mn-ea"/>
+                          <a:cs typeface="+mn-cs"/>
+                        </a:rPr>
+                        <a:t>.</a:t>
+                      </a:r>
+                      <a:endParaRPr lang="en-US" sz="1200" kern="1200" dirty="0" smtClean="0">
+                        <a:solidFill>
+                          <a:schemeClr val="dk1"/>
+                        </a:solidFill>
+                        <a:effectLst/>
+                        <a:latin typeface="+mn-lt"/>
+                        <a:ea typeface="+mn-ea"/>
+                        <a:cs typeface="+mn-cs"/>
+                      </a:endParaRPr>
+                    </a:p>
+                    <a:p>
+                      <a:pPr marL="406400" lvl="2" indent="-342900" algn="l">
+                        <a:buAutoNum type="arabicPeriod"/>
+                      </a:pPr>
+                      <a:r>
+                        <a:rPr lang="id-ID" sz="1800" kern="1200" dirty="0" smtClean="0">
+                          <a:solidFill>
+                            <a:schemeClr val="dk1"/>
+                          </a:solidFill>
+                          <a:effectLst/>
+                          <a:latin typeface="+mn-lt"/>
+                          <a:ea typeface="+mn-ea"/>
+                          <a:cs typeface="+mn-cs"/>
+                        </a:rPr>
+                        <a:t>Penggalian kebutuhan </a:t>
+                      </a:r>
+                      <a:r>
+                        <a:rPr lang="en-US" sz="1800" kern="1200" dirty="0" err="1" smtClean="0">
+                          <a:solidFill>
+                            <a:schemeClr val="dk1"/>
+                          </a:solidFill>
+                          <a:effectLst/>
+                          <a:latin typeface="+mn-lt"/>
+                          <a:ea typeface="+mn-ea"/>
+                          <a:cs typeface="+mn-cs"/>
+                        </a:rPr>
+                        <a:t>pelanggan</a:t>
+                      </a:r>
+                      <a:r>
+                        <a:rPr lang="id-ID" sz="1800" kern="1200" dirty="0" smtClean="0">
+                          <a:solidFill>
+                            <a:schemeClr val="dk1"/>
+                          </a:solidFill>
+                          <a:effectLst/>
+                          <a:latin typeface="+mn-lt"/>
+                          <a:ea typeface="+mn-ea"/>
+                          <a:cs typeface="+mn-cs"/>
+                        </a:rPr>
+                        <a:t> yang terkendala komunikasi.</a:t>
+                      </a:r>
+                      <a:endParaRPr lang="en-US" sz="1200" kern="1200" dirty="0">
+                        <a:solidFill>
+                          <a:schemeClr val="dk1"/>
+                        </a:solidFill>
+                        <a:effectLst/>
+                        <a:latin typeface="+mn-lt"/>
+                        <a:ea typeface="+mn-ea"/>
+                        <a:cs typeface="+mn-cs"/>
+                      </a:endParaRPr>
+                    </a:p>
+                  </a:txBody>
+                  <a:tcPr/>
+                </a:tc>
+              </a:tr>
+              <a:tr h="986873">
+                <a:tc>
+                  <a:txBody>
+                    <a:bodyPr/>
+                    <a:lstStyle/>
+                    <a:p>
+                      <a:r>
+                        <a:rPr lang="en-US" baseline="0" dirty="0" err="1" smtClean="0"/>
+                        <a:t>Risiko</a:t>
+                      </a:r>
+                      <a:r>
+                        <a:rPr lang="en-US" baseline="0" dirty="0" smtClean="0"/>
+                        <a:t> </a:t>
+                      </a:r>
+                      <a:r>
+                        <a:rPr lang="en-US" baseline="0" dirty="0" err="1" smtClean="0"/>
+                        <a:t>Teknis</a:t>
+                      </a:r>
+                      <a:endParaRPr lang="en-US" baseline="0" dirty="0" smtClean="0"/>
+                    </a:p>
+                  </a:txBody>
+                  <a:tcPr/>
+                </a:tc>
+                <a:tc>
+                  <a:txBody>
+                    <a:bodyPr/>
+                    <a:lstStyle/>
+                    <a:p>
+                      <a:pPr marL="406400" lvl="2" indent="-342900">
+                        <a:buAutoNum type="arabicPeriod"/>
+                      </a:pPr>
+                      <a:r>
+                        <a:rPr lang="en-GB" sz="1800" kern="1200" dirty="0" err="1" smtClean="0">
+                          <a:solidFill>
+                            <a:schemeClr val="dk1"/>
+                          </a:solidFill>
+                          <a:effectLst/>
+                          <a:latin typeface="+mn-lt"/>
+                          <a:ea typeface="+mn-ea"/>
+                          <a:cs typeface="+mn-cs"/>
+                        </a:rPr>
+                        <a:t>Kurang</a:t>
+                      </a:r>
+                      <a:r>
+                        <a:rPr lang="en-GB" sz="1800" kern="1200" dirty="0" smtClean="0">
+                          <a:solidFill>
+                            <a:schemeClr val="dk1"/>
+                          </a:solidFill>
+                          <a:effectLst/>
+                          <a:latin typeface="+mn-lt"/>
+                          <a:ea typeface="+mn-ea"/>
+                          <a:cs typeface="+mn-cs"/>
+                        </a:rPr>
+                        <a:t> </a:t>
+                      </a:r>
+                      <a:r>
+                        <a:rPr lang="en-GB" sz="1800" kern="1200" dirty="0" err="1" smtClean="0">
+                          <a:solidFill>
+                            <a:schemeClr val="dk1"/>
+                          </a:solidFill>
+                          <a:effectLst/>
+                          <a:latin typeface="+mn-lt"/>
+                          <a:ea typeface="+mn-ea"/>
+                          <a:cs typeface="+mn-cs"/>
+                        </a:rPr>
+                        <a:t>spesifiknya</a:t>
+                      </a:r>
+                      <a:r>
+                        <a:rPr lang="en-GB" sz="1800" kern="1200" dirty="0" smtClean="0">
+                          <a:solidFill>
+                            <a:schemeClr val="dk1"/>
+                          </a:solidFill>
+                          <a:effectLst/>
+                          <a:latin typeface="+mn-lt"/>
+                          <a:ea typeface="+mn-ea"/>
+                          <a:cs typeface="+mn-cs"/>
+                        </a:rPr>
+                        <a:t> </a:t>
+                      </a:r>
+                      <a:r>
+                        <a:rPr lang="en-GB" sz="1800" kern="1200" dirty="0" err="1" smtClean="0">
+                          <a:solidFill>
+                            <a:schemeClr val="dk1"/>
+                          </a:solidFill>
+                          <a:effectLst/>
+                          <a:latin typeface="+mn-lt"/>
+                          <a:ea typeface="+mn-ea"/>
+                          <a:cs typeface="+mn-cs"/>
+                        </a:rPr>
+                        <a:t>metode</a:t>
+                      </a:r>
+                      <a:r>
+                        <a:rPr lang="en-GB" sz="1800" kern="1200" dirty="0" smtClean="0">
+                          <a:solidFill>
+                            <a:schemeClr val="dk1"/>
+                          </a:solidFill>
+                          <a:effectLst/>
+                          <a:latin typeface="+mn-lt"/>
+                          <a:ea typeface="+mn-ea"/>
+                          <a:cs typeface="+mn-cs"/>
+                        </a:rPr>
+                        <a:t> yang </a:t>
+                      </a:r>
+                      <a:r>
+                        <a:rPr lang="en-GB" sz="1800" kern="1200" dirty="0" err="1" smtClean="0">
+                          <a:solidFill>
+                            <a:schemeClr val="dk1"/>
+                          </a:solidFill>
+                          <a:effectLst/>
+                          <a:latin typeface="+mn-lt"/>
+                          <a:ea typeface="+mn-ea"/>
+                          <a:cs typeface="+mn-cs"/>
+                        </a:rPr>
+                        <a:t>digunakan</a:t>
+                      </a:r>
+                      <a:r>
+                        <a:rPr lang="en-GB" sz="1800" kern="1200" dirty="0" smtClean="0">
+                          <a:solidFill>
+                            <a:schemeClr val="dk1"/>
+                          </a:solidFill>
+                          <a:effectLst/>
+                          <a:latin typeface="+mn-lt"/>
+                          <a:ea typeface="+mn-ea"/>
+                          <a:cs typeface="+mn-cs"/>
+                        </a:rPr>
+                        <a:t>.</a:t>
+                      </a:r>
+                      <a:endParaRPr lang="en-US" sz="1200" kern="1200" dirty="0" smtClean="0">
+                        <a:solidFill>
+                          <a:schemeClr val="dk1"/>
+                        </a:solidFill>
+                        <a:effectLst/>
+                        <a:latin typeface="+mn-lt"/>
+                        <a:ea typeface="+mn-ea"/>
+                        <a:cs typeface="+mn-cs"/>
+                      </a:endParaRPr>
+                    </a:p>
+                    <a:p>
+                      <a:pPr marL="406400" lvl="2" indent="-342900">
+                        <a:buAutoNum type="arabicPeriod"/>
+                      </a:pPr>
+                      <a:r>
+                        <a:rPr lang="en-GB" sz="1800" kern="1200" dirty="0" err="1" smtClean="0">
+                          <a:solidFill>
+                            <a:schemeClr val="dk1"/>
+                          </a:solidFill>
+                          <a:effectLst/>
+                          <a:latin typeface="+mn-lt"/>
+                          <a:ea typeface="+mn-ea"/>
+                          <a:cs typeface="+mn-cs"/>
+                        </a:rPr>
+                        <a:t>Tidak</a:t>
+                      </a:r>
+                      <a:r>
+                        <a:rPr lang="en-GB" sz="1800" kern="1200" dirty="0" smtClean="0">
+                          <a:solidFill>
+                            <a:schemeClr val="dk1"/>
+                          </a:solidFill>
+                          <a:effectLst/>
+                          <a:latin typeface="+mn-lt"/>
+                          <a:ea typeface="+mn-ea"/>
+                          <a:cs typeface="+mn-cs"/>
+                        </a:rPr>
+                        <a:t> </a:t>
+                      </a:r>
+                      <a:r>
+                        <a:rPr lang="en-GB" sz="1800" kern="1200" dirty="0" err="1" smtClean="0">
+                          <a:solidFill>
+                            <a:schemeClr val="dk1"/>
+                          </a:solidFill>
+                          <a:effectLst/>
+                          <a:latin typeface="+mn-lt"/>
+                          <a:ea typeface="+mn-ea"/>
+                          <a:cs typeface="+mn-cs"/>
+                        </a:rPr>
+                        <a:t>ada</a:t>
+                      </a:r>
+                      <a:r>
+                        <a:rPr lang="en-GB" sz="1800" kern="1200" dirty="0" smtClean="0">
+                          <a:solidFill>
+                            <a:schemeClr val="dk1"/>
+                          </a:solidFill>
+                          <a:effectLst/>
+                          <a:latin typeface="+mn-lt"/>
+                          <a:ea typeface="+mn-ea"/>
+                          <a:cs typeface="+mn-cs"/>
+                        </a:rPr>
+                        <a:t> </a:t>
+                      </a:r>
+                      <a:r>
+                        <a:rPr lang="en-GB" sz="1800" kern="1200" dirty="0" err="1" smtClean="0">
+                          <a:solidFill>
+                            <a:schemeClr val="dk1"/>
+                          </a:solidFill>
+                          <a:effectLst/>
+                          <a:latin typeface="+mn-lt"/>
+                          <a:ea typeface="+mn-ea"/>
+                          <a:cs typeface="+mn-cs"/>
+                        </a:rPr>
+                        <a:t>perangkat</a:t>
+                      </a:r>
+                      <a:r>
+                        <a:rPr lang="en-GB" sz="1800" kern="1200" dirty="0" smtClean="0">
+                          <a:solidFill>
+                            <a:schemeClr val="dk1"/>
+                          </a:solidFill>
+                          <a:effectLst/>
+                          <a:latin typeface="+mn-lt"/>
+                          <a:ea typeface="+mn-ea"/>
+                          <a:cs typeface="+mn-cs"/>
+                        </a:rPr>
+                        <a:t> </a:t>
+                      </a:r>
+                      <a:r>
+                        <a:rPr lang="en-GB" sz="1800" kern="1200" dirty="0" err="1" smtClean="0">
+                          <a:solidFill>
+                            <a:schemeClr val="dk1"/>
+                          </a:solidFill>
+                          <a:effectLst/>
+                          <a:latin typeface="+mn-lt"/>
+                          <a:ea typeface="+mn-ea"/>
+                          <a:cs typeface="+mn-cs"/>
+                        </a:rPr>
+                        <a:t>lunak</a:t>
+                      </a:r>
+                      <a:r>
+                        <a:rPr lang="en-GB" sz="1800" kern="1200" dirty="0" smtClean="0">
+                          <a:solidFill>
+                            <a:schemeClr val="dk1"/>
+                          </a:solidFill>
+                          <a:effectLst/>
+                          <a:latin typeface="+mn-lt"/>
+                          <a:ea typeface="+mn-ea"/>
+                          <a:cs typeface="+mn-cs"/>
+                        </a:rPr>
+                        <a:t> lain yang </a:t>
+                      </a:r>
+                      <a:r>
+                        <a:rPr lang="en-GB" sz="1800" kern="1200" dirty="0" err="1" smtClean="0">
+                          <a:solidFill>
+                            <a:schemeClr val="dk1"/>
+                          </a:solidFill>
+                          <a:effectLst/>
+                          <a:latin typeface="+mn-lt"/>
+                          <a:ea typeface="+mn-ea"/>
+                          <a:cs typeface="+mn-cs"/>
+                        </a:rPr>
+                        <a:t>mendukung</a:t>
+                      </a:r>
+                      <a:r>
+                        <a:rPr lang="en-GB" sz="1800" kern="1200" dirty="0" smtClean="0">
+                          <a:solidFill>
+                            <a:schemeClr val="dk1"/>
+                          </a:solidFill>
+                          <a:effectLst/>
+                          <a:latin typeface="+mn-lt"/>
+                          <a:ea typeface="+mn-ea"/>
+                          <a:cs typeface="+mn-cs"/>
+                        </a:rPr>
+                        <a:t> proses </a:t>
+                      </a:r>
+                      <a:r>
+                        <a:rPr lang="en-GB" sz="1800" kern="1200" dirty="0" err="1" smtClean="0">
+                          <a:solidFill>
+                            <a:schemeClr val="dk1"/>
+                          </a:solidFill>
+                          <a:effectLst/>
+                          <a:latin typeface="+mn-lt"/>
+                          <a:ea typeface="+mn-ea"/>
+                          <a:cs typeface="+mn-cs"/>
+                        </a:rPr>
+                        <a:t>pengujian</a:t>
+                      </a:r>
+                      <a:r>
+                        <a:rPr lang="en-GB" sz="1800" kern="1200" dirty="0" smtClean="0">
+                          <a:solidFill>
+                            <a:schemeClr val="dk1"/>
+                          </a:solidFill>
+                          <a:effectLst/>
+                          <a:latin typeface="+mn-lt"/>
+                          <a:ea typeface="+mn-ea"/>
+                          <a:cs typeface="+mn-cs"/>
+                        </a:rPr>
+                        <a:t>.</a:t>
+                      </a:r>
+                      <a:endParaRPr lang="en-US" sz="1200" kern="1200" dirty="0" smtClean="0">
+                        <a:solidFill>
+                          <a:schemeClr val="dk1"/>
+                        </a:solidFill>
+                        <a:effectLst/>
+                        <a:latin typeface="+mn-lt"/>
+                        <a:ea typeface="+mn-ea"/>
+                        <a:cs typeface="+mn-cs"/>
+                      </a:endParaRPr>
+                    </a:p>
+                    <a:p>
+                      <a:pPr marL="406400" lvl="2" indent="-342900">
+                        <a:buAutoNum type="arabicPeriod"/>
+                      </a:pPr>
+                      <a:r>
+                        <a:rPr lang="en-GB" sz="1800" kern="1200" dirty="0" err="1" smtClean="0">
+                          <a:solidFill>
+                            <a:schemeClr val="dk1"/>
+                          </a:solidFill>
+                          <a:effectLst/>
+                          <a:latin typeface="+mn-lt"/>
+                          <a:ea typeface="+mn-ea"/>
+                          <a:cs typeface="+mn-cs"/>
+                        </a:rPr>
+                        <a:t>Tidak</a:t>
+                      </a:r>
+                      <a:r>
+                        <a:rPr lang="en-GB" sz="1800" kern="1200" dirty="0" smtClean="0">
+                          <a:solidFill>
+                            <a:schemeClr val="dk1"/>
+                          </a:solidFill>
+                          <a:effectLst/>
+                          <a:latin typeface="+mn-lt"/>
+                          <a:ea typeface="+mn-ea"/>
+                          <a:cs typeface="+mn-cs"/>
+                        </a:rPr>
+                        <a:t> </a:t>
+                      </a:r>
+                      <a:r>
+                        <a:rPr lang="en-GB" sz="1800" kern="1200" dirty="0" err="1" smtClean="0">
+                          <a:solidFill>
+                            <a:schemeClr val="dk1"/>
+                          </a:solidFill>
+                          <a:effectLst/>
+                          <a:latin typeface="+mn-lt"/>
+                          <a:ea typeface="+mn-ea"/>
+                          <a:cs typeface="+mn-cs"/>
+                        </a:rPr>
+                        <a:t>ditemukan</a:t>
+                      </a:r>
+                      <a:r>
+                        <a:rPr lang="en-GB" sz="1800" kern="1200" dirty="0" smtClean="0">
+                          <a:solidFill>
+                            <a:schemeClr val="dk1"/>
+                          </a:solidFill>
+                          <a:effectLst/>
+                          <a:latin typeface="+mn-lt"/>
+                          <a:ea typeface="+mn-ea"/>
+                          <a:cs typeface="+mn-cs"/>
+                        </a:rPr>
+                        <a:t> </a:t>
+                      </a:r>
+                      <a:r>
+                        <a:rPr lang="en-GB" sz="1800" kern="1200" dirty="0" err="1" smtClean="0">
+                          <a:solidFill>
+                            <a:schemeClr val="dk1"/>
+                          </a:solidFill>
+                          <a:effectLst/>
+                          <a:latin typeface="+mn-lt"/>
+                          <a:ea typeface="+mn-ea"/>
+                          <a:cs typeface="+mn-cs"/>
+                        </a:rPr>
+                        <a:t>perangkat</a:t>
+                      </a:r>
+                      <a:r>
+                        <a:rPr lang="en-GB" sz="1800" kern="1200" dirty="0" smtClean="0">
+                          <a:solidFill>
+                            <a:schemeClr val="dk1"/>
+                          </a:solidFill>
+                          <a:effectLst/>
+                          <a:latin typeface="+mn-lt"/>
+                          <a:ea typeface="+mn-ea"/>
+                          <a:cs typeface="+mn-cs"/>
+                        </a:rPr>
+                        <a:t> </a:t>
+                      </a:r>
+                      <a:r>
+                        <a:rPr lang="en-GB" sz="1800" kern="1200" dirty="0" err="1" smtClean="0">
+                          <a:solidFill>
+                            <a:schemeClr val="dk1"/>
+                          </a:solidFill>
+                          <a:effectLst/>
+                          <a:latin typeface="+mn-lt"/>
+                          <a:ea typeface="+mn-ea"/>
+                          <a:cs typeface="+mn-cs"/>
+                        </a:rPr>
+                        <a:t>lunak</a:t>
+                      </a:r>
+                      <a:r>
+                        <a:rPr lang="en-GB" sz="1800" kern="1200" dirty="0" smtClean="0">
+                          <a:solidFill>
+                            <a:schemeClr val="dk1"/>
+                          </a:solidFill>
+                          <a:effectLst/>
+                          <a:latin typeface="+mn-lt"/>
+                          <a:ea typeface="+mn-ea"/>
+                          <a:cs typeface="+mn-cs"/>
+                        </a:rPr>
+                        <a:t> lain </a:t>
+                      </a:r>
+                      <a:r>
+                        <a:rPr lang="en-GB" sz="1800" kern="1200" dirty="0" err="1" smtClean="0">
+                          <a:solidFill>
+                            <a:schemeClr val="dk1"/>
+                          </a:solidFill>
+                          <a:effectLst/>
+                          <a:latin typeface="+mn-lt"/>
+                          <a:ea typeface="+mn-ea"/>
+                          <a:cs typeface="+mn-cs"/>
+                        </a:rPr>
+                        <a:t>untuk</a:t>
+                      </a:r>
+                      <a:r>
+                        <a:rPr lang="en-GB" sz="1800" kern="1200" dirty="0" smtClean="0">
+                          <a:solidFill>
+                            <a:schemeClr val="dk1"/>
+                          </a:solidFill>
+                          <a:effectLst/>
+                          <a:latin typeface="+mn-lt"/>
+                          <a:ea typeface="+mn-ea"/>
+                          <a:cs typeface="+mn-cs"/>
+                        </a:rPr>
+                        <a:t> </a:t>
+                      </a:r>
+                      <a:r>
+                        <a:rPr lang="en-GB" sz="1800" kern="1200" dirty="0" err="1" smtClean="0">
+                          <a:solidFill>
+                            <a:schemeClr val="dk1"/>
+                          </a:solidFill>
+                          <a:effectLst/>
+                          <a:latin typeface="+mn-lt"/>
+                          <a:ea typeface="+mn-ea"/>
+                          <a:cs typeface="+mn-cs"/>
+                        </a:rPr>
+                        <a:t>mendukung</a:t>
+                      </a:r>
+                      <a:r>
+                        <a:rPr lang="en-GB" sz="1800" kern="1200" dirty="0" smtClean="0">
+                          <a:solidFill>
+                            <a:schemeClr val="dk1"/>
+                          </a:solidFill>
+                          <a:effectLst/>
+                          <a:latin typeface="+mn-lt"/>
+                          <a:ea typeface="+mn-ea"/>
+                          <a:cs typeface="+mn-cs"/>
+                        </a:rPr>
+                        <a:t> </a:t>
+                      </a:r>
+                      <a:r>
+                        <a:rPr lang="en-GB" sz="1800" kern="1200" dirty="0" err="1" smtClean="0">
+                          <a:solidFill>
+                            <a:schemeClr val="dk1"/>
+                          </a:solidFill>
+                          <a:effectLst/>
+                          <a:latin typeface="+mn-lt"/>
+                          <a:ea typeface="+mn-ea"/>
+                          <a:cs typeface="+mn-cs"/>
+                        </a:rPr>
+                        <a:t>analisis</a:t>
+                      </a:r>
+                      <a:r>
+                        <a:rPr lang="en-GB" sz="1800" kern="1200" dirty="0" smtClean="0">
+                          <a:solidFill>
+                            <a:schemeClr val="dk1"/>
+                          </a:solidFill>
+                          <a:effectLst/>
+                          <a:latin typeface="+mn-lt"/>
+                          <a:ea typeface="+mn-ea"/>
+                          <a:cs typeface="+mn-cs"/>
+                        </a:rPr>
+                        <a:t> </a:t>
+                      </a:r>
+                      <a:r>
+                        <a:rPr lang="en-GB" sz="1800" kern="1200" dirty="0" err="1" smtClean="0">
+                          <a:solidFill>
+                            <a:schemeClr val="dk1"/>
+                          </a:solidFill>
+                          <a:effectLst/>
+                          <a:latin typeface="+mn-lt"/>
+                          <a:ea typeface="+mn-ea"/>
+                          <a:cs typeface="+mn-cs"/>
+                        </a:rPr>
+                        <a:t>perangkat</a:t>
+                      </a:r>
+                      <a:r>
+                        <a:rPr lang="en-GB" sz="1800" kern="1200" dirty="0" smtClean="0">
+                          <a:solidFill>
+                            <a:schemeClr val="dk1"/>
+                          </a:solidFill>
+                          <a:effectLst/>
+                          <a:latin typeface="+mn-lt"/>
+                          <a:ea typeface="+mn-ea"/>
+                          <a:cs typeface="+mn-cs"/>
+                        </a:rPr>
+                        <a:t> </a:t>
+                      </a:r>
+                      <a:r>
+                        <a:rPr lang="en-GB" sz="1800" kern="1200" dirty="0" err="1" smtClean="0">
+                          <a:solidFill>
+                            <a:schemeClr val="dk1"/>
+                          </a:solidFill>
+                          <a:effectLst/>
+                          <a:latin typeface="+mn-lt"/>
+                          <a:ea typeface="+mn-ea"/>
+                          <a:cs typeface="+mn-cs"/>
+                        </a:rPr>
+                        <a:t>lunak</a:t>
+                      </a:r>
+                      <a:r>
+                        <a:rPr lang="en-GB" sz="1800" kern="1200" dirty="0" smtClean="0">
+                          <a:solidFill>
+                            <a:schemeClr val="dk1"/>
+                          </a:solidFill>
+                          <a:effectLst/>
+                          <a:latin typeface="+mn-lt"/>
+                          <a:ea typeface="+mn-ea"/>
+                          <a:cs typeface="+mn-cs"/>
+                        </a:rPr>
+                        <a:t> </a:t>
+                      </a:r>
+                      <a:r>
+                        <a:rPr lang="en-GB" sz="1800" kern="1200" dirty="0" err="1" smtClean="0">
+                          <a:solidFill>
+                            <a:schemeClr val="dk1"/>
+                          </a:solidFill>
+                          <a:effectLst/>
+                          <a:latin typeface="+mn-lt"/>
+                          <a:ea typeface="+mn-ea"/>
+                          <a:cs typeface="+mn-cs"/>
+                        </a:rPr>
+                        <a:t>dan</a:t>
+                      </a:r>
+                      <a:r>
+                        <a:rPr lang="en-GB" sz="1800" kern="1200" dirty="0" smtClean="0">
+                          <a:solidFill>
+                            <a:schemeClr val="dk1"/>
+                          </a:solidFill>
+                          <a:effectLst/>
+                          <a:latin typeface="+mn-lt"/>
+                          <a:ea typeface="+mn-ea"/>
+                          <a:cs typeface="+mn-cs"/>
+                        </a:rPr>
+                        <a:t> </a:t>
+                      </a:r>
+                      <a:r>
+                        <a:rPr lang="en-GB" sz="1800" kern="1200" dirty="0" err="1" smtClean="0">
+                          <a:solidFill>
+                            <a:schemeClr val="dk1"/>
+                          </a:solidFill>
+                          <a:effectLst/>
+                          <a:latin typeface="+mn-lt"/>
+                          <a:ea typeface="+mn-ea"/>
+                          <a:cs typeface="+mn-cs"/>
+                        </a:rPr>
+                        <a:t>desain</a:t>
+                      </a:r>
+                      <a:r>
+                        <a:rPr lang="en-GB" sz="1800" kern="1200" dirty="0" smtClean="0">
+                          <a:solidFill>
+                            <a:schemeClr val="dk1"/>
+                          </a:solidFill>
+                          <a:effectLst/>
+                          <a:latin typeface="+mn-lt"/>
+                          <a:ea typeface="+mn-ea"/>
+                          <a:cs typeface="+mn-cs"/>
+                        </a:rPr>
+                        <a:t> proses.</a:t>
+                      </a:r>
+                      <a:endParaRPr lang="en-US" sz="1200" kern="1200" dirty="0">
+                        <a:solidFill>
+                          <a:schemeClr val="dk1"/>
+                        </a:solidFill>
+                        <a:effectLst/>
+                        <a:latin typeface="+mn-lt"/>
+                        <a:ea typeface="+mn-ea"/>
+                        <a:cs typeface="+mn-cs"/>
+                      </a:endParaRPr>
+                    </a:p>
+                  </a:txBody>
+                  <a:tcPr/>
+                </a:tc>
+              </a:tr>
+              <a:tr h="986873">
+                <a:tc>
+                  <a:txBody>
+                    <a:bodyPr/>
+                    <a:lstStyle/>
+                    <a:p>
+                      <a:r>
+                        <a:rPr lang="en-US" dirty="0" err="1" smtClean="0"/>
+                        <a:t>Risiko</a:t>
+                      </a:r>
+                      <a:r>
+                        <a:rPr lang="en-US" baseline="0" dirty="0" smtClean="0"/>
+                        <a:t> </a:t>
+                      </a:r>
+                      <a:r>
+                        <a:rPr lang="en-US" baseline="0" dirty="0" err="1" smtClean="0"/>
+                        <a:t>Ketersediaan</a:t>
+                      </a:r>
+                      <a:r>
+                        <a:rPr lang="en-US" baseline="0" dirty="0" smtClean="0"/>
+                        <a:t> </a:t>
+                      </a:r>
+                      <a:r>
+                        <a:rPr lang="en-US" baseline="0" dirty="0" err="1" smtClean="0"/>
+                        <a:t>Personalia</a:t>
+                      </a:r>
+                      <a:endParaRPr lang="en-US" dirty="0"/>
+                    </a:p>
+                  </a:txBody>
+                  <a:tcPr/>
+                </a:tc>
+                <a:tc>
+                  <a:txBody>
+                    <a:bodyPr/>
+                    <a:lstStyle/>
+                    <a:p>
+                      <a:pPr marL="406400" lvl="2" indent="-342900">
+                        <a:buAutoNum type="arabicPeriod"/>
+                      </a:pPr>
+                      <a:r>
+                        <a:rPr lang="en-GB" sz="1800" kern="1200" dirty="0" err="1" smtClean="0">
+                          <a:solidFill>
+                            <a:schemeClr val="dk1"/>
+                          </a:solidFill>
+                          <a:effectLst/>
+                          <a:latin typeface="+mn-lt"/>
+                          <a:ea typeface="+mn-ea"/>
+                          <a:cs typeface="+mn-cs"/>
+                        </a:rPr>
+                        <a:t>Kurang</a:t>
+                      </a:r>
+                      <a:r>
+                        <a:rPr lang="en-GB" sz="1800" kern="1200" dirty="0" smtClean="0">
+                          <a:solidFill>
+                            <a:schemeClr val="dk1"/>
+                          </a:solidFill>
+                          <a:effectLst/>
+                          <a:latin typeface="+mn-lt"/>
+                          <a:ea typeface="+mn-ea"/>
+                          <a:cs typeface="+mn-cs"/>
+                        </a:rPr>
+                        <a:t> </a:t>
+                      </a:r>
+                      <a:r>
+                        <a:rPr lang="en-GB" sz="1800" kern="1200" dirty="0" err="1" smtClean="0">
+                          <a:solidFill>
+                            <a:schemeClr val="dk1"/>
+                          </a:solidFill>
+                          <a:effectLst/>
+                          <a:latin typeface="+mn-lt"/>
+                          <a:ea typeface="+mn-ea"/>
+                          <a:cs typeface="+mn-cs"/>
+                        </a:rPr>
+                        <a:t>berkomitmennya</a:t>
+                      </a:r>
+                      <a:r>
+                        <a:rPr lang="en-GB" sz="1800" kern="1200" dirty="0" smtClean="0">
+                          <a:solidFill>
+                            <a:schemeClr val="dk1"/>
+                          </a:solidFill>
+                          <a:effectLst/>
+                          <a:latin typeface="+mn-lt"/>
+                          <a:ea typeface="+mn-ea"/>
+                          <a:cs typeface="+mn-cs"/>
+                        </a:rPr>
+                        <a:t> </a:t>
+                      </a:r>
+                      <a:r>
+                        <a:rPr lang="en-GB" sz="1800" kern="1200" dirty="0" err="1" smtClean="0">
+                          <a:solidFill>
+                            <a:schemeClr val="dk1"/>
+                          </a:solidFill>
+                          <a:effectLst/>
+                          <a:latin typeface="+mn-lt"/>
+                          <a:ea typeface="+mn-ea"/>
+                          <a:cs typeface="+mn-cs"/>
+                        </a:rPr>
+                        <a:t>staf</a:t>
+                      </a:r>
+                      <a:r>
+                        <a:rPr lang="en-GB" sz="1800" kern="1200" dirty="0" smtClean="0">
+                          <a:solidFill>
+                            <a:schemeClr val="dk1"/>
+                          </a:solidFill>
+                          <a:effectLst/>
+                          <a:latin typeface="+mn-lt"/>
+                          <a:ea typeface="+mn-ea"/>
+                          <a:cs typeface="+mn-cs"/>
+                        </a:rPr>
+                        <a:t> </a:t>
+                      </a:r>
+                      <a:r>
+                        <a:rPr lang="en-GB" sz="1800" kern="1200" dirty="0" err="1" smtClean="0">
+                          <a:solidFill>
+                            <a:schemeClr val="dk1"/>
+                          </a:solidFill>
+                          <a:effectLst/>
+                          <a:latin typeface="+mn-lt"/>
+                          <a:ea typeface="+mn-ea"/>
+                          <a:cs typeface="+mn-cs"/>
+                        </a:rPr>
+                        <a:t>dalam</a:t>
+                      </a:r>
+                      <a:r>
+                        <a:rPr lang="en-GB" sz="1800" kern="1200" dirty="0" smtClean="0">
+                          <a:solidFill>
+                            <a:schemeClr val="dk1"/>
+                          </a:solidFill>
+                          <a:effectLst/>
+                          <a:latin typeface="+mn-lt"/>
+                          <a:ea typeface="+mn-ea"/>
+                          <a:cs typeface="+mn-cs"/>
+                        </a:rPr>
+                        <a:t> </a:t>
+                      </a:r>
+                      <a:r>
+                        <a:rPr lang="en-GB" sz="1800" kern="1200" dirty="0" err="1" smtClean="0">
+                          <a:solidFill>
+                            <a:schemeClr val="dk1"/>
+                          </a:solidFill>
+                          <a:effectLst/>
+                          <a:latin typeface="+mn-lt"/>
+                          <a:ea typeface="+mn-ea"/>
+                          <a:cs typeface="+mn-cs"/>
+                        </a:rPr>
+                        <a:t>pengerjaan</a:t>
+                      </a:r>
+                      <a:r>
+                        <a:rPr lang="en-GB" sz="1800" kern="1200" dirty="0" smtClean="0">
+                          <a:solidFill>
+                            <a:schemeClr val="dk1"/>
+                          </a:solidFill>
+                          <a:effectLst/>
+                          <a:latin typeface="+mn-lt"/>
+                          <a:ea typeface="+mn-ea"/>
+                          <a:cs typeface="+mn-cs"/>
+                        </a:rPr>
+                        <a:t> </a:t>
+                      </a:r>
+                      <a:r>
+                        <a:rPr lang="en-GB" sz="1800" kern="1200" dirty="0" err="1" smtClean="0">
+                          <a:solidFill>
+                            <a:schemeClr val="dk1"/>
+                          </a:solidFill>
+                          <a:effectLst/>
+                          <a:latin typeface="+mn-lt"/>
+                          <a:ea typeface="+mn-ea"/>
+                          <a:cs typeface="+mn-cs"/>
+                        </a:rPr>
+                        <a:t>proyek</a:t>
+                      </a:r>
+                      <a:r>
+                        <a:rPr lang="en-GB" sz="1800" kern="1200" dirty="0" smtClean="0">
+                          <a:solidFill>
+                            <a:schemeClr val="dk1"/>
+                          </a:solidFill>
+                          <a:effectLst/>
+                          <a:latin typeface="+mn-lt"/>
+                          <a:ea typeface="+mn-ea"/>
+                          <a:cs typeface="+mn-cs"/>
+                        </a:rPr>
+                        <a:t>.</a:t>
+                      </a:r>
+                      <a:endParaRPr lang="en-US" sz="1200" kern="1200" dirty="0" smtClean="0">
+                        <a:solidFill>
+                          <a:schemeClr val="dk1"/>
+                        </a:solidFill>
+                        <a:effectLst/>
+                        <a:latin typeface="+mn-lt"/>
+                        <a:ea typeface="+mn-ea"/>
+                        <a:cs typeface="+mn-cs"/>
+                      </a:endParaRPr>
+                    </a:p>
+                    <a:p>
+                      <a:pPr marL="406400" lvl="2" indent="-342900">
+                        <a:buAutoNum type="arabicPeriod"/>
+                      </a:pPr>
+                      <a:r>
+                        <a:rPr lang="en-GB" sz="1800" kern="1200" dirty="0" err="1" smtClean="0">
+                          <a:solidFill>
+                            <a:schemeClr val="dk1"/>
+                          </a:solidFill>
+                          <a:effectLst/>
+                          <a:latin typeface="+mn-lt"/>
+                          <a:ea typeface="+mn-ea"/>
+                          <a:cs typeface="+mn-cs"/>
+                        </a:rPr>
+                        <a:t>Kurangnya</a:t>
+                      </a:r>
+                      <a:r>
+                        <a:rPr lang="en-GB" sz="1800" kern="1200" dirty="0" smtClean="0">
+                          <a:solidFill>
+                            <a:schemeClr val="dk1"/>
+                          </a:solidFill>
+                          <a:effectLst/>
+                          <a:latin typeface="+mn-lt"/>
+                          <a:ea typeface="+mn-ea"/>
+                          <a:cs typeface="+mn-cs"/>
+                        </a:rPr>
+                        <a:t> </a:t>
+                      </a:r>
+                      <a:r>
+                        <a:rPr lang="en-GB" sz="1800" kern="1200" dirty="0" err="1" smtClean="0">
+                          <a:solidFill>
+                            <a:schemeClr val="dk1"/>
+                          </a:solidFill>
+                          <a:effectLst/>
+                          <a:latin typeface="+mn-lt"/>
+                          <a:ea typeface="+mn-ea"/>
+                          <a:cs typeface="+mn-cs"/>
+                        </a:rPr>
+                        <a:t>jumlah</a:t>
+                      </a:r>
+                      <a:r>
+                        <a:rPr lang="en-GB" sz="1800" kern="1200" dirty="0" smtClean="0">
+                          <a:solidFill>
+                            <a:schemeClr val="dk1"/>
+                          </a:solidFill>
+                          <a:effectLst/>
+                          <a:latin typeface="+mn-lt"/>
+                          <a:ea typeface="+mn-ea"/>
+                          <a:cs typeface="+mn-cs"/>
+                        </a:rPr>
+                        <a:t> </a:t>
+                      </a:r>
+                      <a:r>
+                        <a:rPr lang="en-GB" sz="1800" kern="1200" dirty="0" err="1" smtClean="0">
+                          <a:solidFill>
+                            <a:schemeClr val="dk1"/>
+                          </a:solidFill>
+                          <a:effectLst/>
+                          <a:latin typeface="+mn-lt"/>
+                          <a:ea typeface="+mn-ea"/>
+                          <a:cs typeface="+mn-cs"/>
+                        </a:rPr>
+                        <a:t>staf</a:t>
+                      </a:r>
+                      <a:r>
+                        <a:rPr lang="en-GB" sz="1800" kern="1200" dirty="0" smtClean="0">
+                          <a:solidFill>
+                            <a:schemeClr val="dk1"/>
+                          </a:solidFill>
+                          <a:effectLst/>
+                          <a:latin typeface="+mn-lt"/>
+                          <a:ea typeface="+mn-ea"/>
+                          <a:cs typeface="+mn-cs"/>
+                        </a:rPr>
+                        <a:t> </a:t>
+                      </a:r>
+                      <a:r>
+                        <a:rPr lang="en-GB" sz="1800" kern="1200" dirty="0" err="1" smtClean="0">
+                          <a:solidFill>
+                            <a:schemeClr val="dk1"/>
+                          </a:solidFill>
+                          <a:effectLst/>
+                          <a:latin typeface="+mn-lt"/>
+                          <a:ea typeface="+mn-ea"/>
+                          <a:cs typeface="+mn-cs"/>
+                        </a:rPr>
+                        <a:t>karena</a:t>
+                      </a:r>
+                      <a:r>
+                        <a:rPr lang="en-GB" sz="1800" kern="1200" dirty="0" smtClean="0">
+                          <a:solidFill>
+                            <a:schemeClr val="dk1"/>
+                          </a:solidFill>
+                          <a:effectLst/>
+                          <a:latin typeface="+mn-lt"/>
+                          <a:ea typeface="+mn-ea"/>
+                          <a:cs typeface="+mn-cs"/>
+                        </a:rPr>
+                        <a:t> </a:t>
+                      </a:r>
+                      <a:r>
+                        <a:rPr lang="en-GB" sz="1800" kern="1200" dirty="0" err="1" smtClean="0">
+                          <a:solidFill>
+                            <a:schemeClr val="dk1"/>
+                          </a:solidFill>
+                          <a:effectLst/>
+                          <a:latin typeface="+mn-lt"/>
+                          <a:ea typeface="+mn-ea"/>
+                          <a:cs typeface="+mn-cs"/>
+                        </a:rPr>
+                        <a:t>kompleksitas</a:t>
+                      </a:r>
+                      <a:r>
+                        <a:rPr lang="en-GB" sz="1800" kern="1200" dirty="0" smtClean="0">
+                          <a:solidFill>
+                            <a:schemeClr val="dk1"/>
+                          </a:solidFill>
+                          <a:effectLst/>
+                          <a:latin typeface="+mn-lt"/>
+                          <a:ea typeface="+mn-ea"/>
+                          <a:cs typeface="+mn-cs"/>
+                        </a:rPr>
+                        <a:t> </a:t>
+                      </a:r>
+                      <a:r>
+                        <a:rPr lang="en-GB" sz="1800" kern="1200" dirty="0" err="1" smtClean="0">
+                          <a:solidFill>
+                            <a:schemeClr val="dk1"/>
+                          </a:solidFill>
+                          <a:effectLst/>
+                          <a:latin typeface="+mn-lt"/>
+                          <a:ea typeface="+mn-ea"/>
+                          <a:cs typeface="+mn-cs"/>
+                        </a:rPr>
+                        <a:t>produk</a:t>
+                      </a:r>
+                      <a:r>
+                        <a:rPr lang="en-GB" sz="1800" kern="1200" dirty="0" smtClean="0">
+                          <a:solidFill>
+                            <a:schemeClr val="dk1"/>
+                          </a:solidFill>
+                          <a:effectLst/>
+                          <a:latin typeface="+mn-lt"/>
+                          <a:ea typeface="+mn-ea"/>
+                          <a:cs typeface="+mn-cs"/>
+                        </a:rPr>
+                        <a:t>.</a:t>
+                      </a:r>
+                      <a:endParaRPr lang="en-US" sz="1200" kern="1200" dirty="0" smtClean="0">
+                        <a:solidFill>
+                          <a:schemeClr val="dk1"/>
+                        </a:solidFill>
+                        <a:effectLst/>
+                        <a:latin typeface="+mn-lt"/>
+                        <a:ea typeface="+mn-ea"/>
+                        <a:cs typeface="+mn-cs"/>
+                      </a:endParaRPr>
+                    </a:p>
+                    <a:p>
+                      <a:pPr marL="406400" lvl="2" indent="-342900">
+                        <a:buAutoNum type="arabicPeriod"/>
+                      </a:pPr>
+                      <a:r>
+                        <a:rPr lang="en-GB" sz="1800" kern="1200" dirty="0" smtClean="0">
+                          <a:solidFill>
+                            <a:schemeClr val="dk1"/>
+                          </a:solidFill>
+                          <a:effectLst/>
+                          <a:latin typeface="+mn-lt"/>
+                          <a:ea typeface="+mn-ea"/>
+                          <a:cs typeface="+mn-cs"/>
+                        </a:rPr>
+                        <a:t>Tingkat </a:t>
+                      </a:r>
+                      <a:r>
+                        <a:rPr lang="en-GB" sz="1800" i="1" kern="1200" dirty="0" smtClean="0">
+                          <a:solidFill>
+                            <a:schemeClr val="dk1"/>
+                          </a:solidFill>
+                          <a:effectLst/>
+                          <a:latin typeface="+mn-lt"/>
+                          <a:ea typeface="+mn-ea"/>
+                          <a:cs typeface="+mn-cs"/>
+                        </a:rPr>
+                        <a:t>turnover</a:t>
+                      </a:r>
+                      <a:r>
+                        <a:rPr lang="en-GB" sz="1800" kern="1200" dirty="0" smtClean="0">
+                          <a:solidFill>
+                            <a:schemeClr val="dk1"/>
+                          </a:solidFill>
+                          <a:effectLst/>
+                          <a:latin typeface="+mn-lt"/>
+                          <a:ea typeface="+mn-ea"/>
+                          <a:cs typeface="+mn-cs"/>
+                        </a:rPr>
+                        <a:t> (</a:t>
+                      </a:r>
+                      <a:r>
+                        <a:rPr lang="en-GB" sz="1800" kern="1200" dirty="0" err="1" smtClean="0">
+                          <a:solidFill>
+                            <a:schemeClr val="dk1"/>
+                          </a:solidFill>
+                          <a:effectLst/>
+                          <a:latin typeface="+mn-lt"/>
+                          <a:ea typeface="+mn-ea"/>
+                          <a:cs typeface="+mn-cs"/>
+                        </a:rPr>
+                        <a:t>pergantian</a:t>
+                      </a:r>
+                      <a:r>
+                        <a:rPr lang="en-GB" sz="1800" kern="1200" dirty="0" smtClean="0">
+                          <a:solidFill>
+                            <a:schemeClr val="dk1"/>
+                          </a:solidFill>
+                          <a:effectLst/>
+                          <a:latin typeface="+mn-lt"/>
+                          <a:ea typeface="+mn-ea"/>
+                          <a:cs typeface="+mn-cs"/>
+                        </a:rPr>
+                        <a:t>) </a:t>
+                      </a:r>
+                      <a:r>
+                        <a:rPr lang="en-GB" sz="1800" kern="1200" dirty="0" err="1" smtClean="0">
+                          <a:solidFill>
+                            <a:schemeClr val="dk1"/>
+                          </a:solidFill>
+                          <a:effectLst/>
+                          <a:latin typeface="+mn-lt"/>
+                          <a:ea typeface="+mn-ea"/>
+                          <a:cs typeface="+mn-cs"/>
+                        </a:rPr>
+                        <a:t>staf</a:t>
+                      </a:r>
+                      <a:r>
+                        <a:rPr lang="en-GB" sz="1800" kern="1200" dirty="0" smtClean="0">
+                          <a:solidFill>
+                            <a:schemeClr val="dk1"/>
+                          </a:solidFill>
+                          <a:effectLst/>
+                          <a:latin typeface="+mn-lt"/>
+                          <a:ea typeface="+mn-ea"/>
+                          <a:cs typeface="+mn-cs"/>
+                        </a:rPr>
+                        <a:t> yang </a:t>
+                      </a:r>
+                      <a:r>
+                        <a:rPr lang="en-GB" sz="1800" kern="1200" dirty="0" err="1" smtClean="0">
+                          <a:solidFill>
+                            <a:schemeClr val="dk1"/>
+                          </a:solidFill>
+                          <a:effectLst/>
+                          <a:latin typeface="+mn-lt"/>
+                          <a:ea typeface="+mn-ea"/>
+                          <a:cs typeface="+mn-cs"/>
+                        </a:rPr>
+                        <a:t>tinggi</a:t>
+                      </a:r>
+                      <a:r>
+                        <a:rPr lang="en-GB" sz="1800" kern="1200" dirty="0" smtClean="0">
+                          <a:solidFill>
+                            <a:schemeClr val="dk1"/>
+                          </a:solidFill>
+                          <a:effectLst/>
+                          <a:latin typeface="+mn-lt"/>
+                          <a:ea typeface="+mn-ea"/>
+                          <a:cs typeface="+mn-cs"/>
+                        </a:rPr>
+                        <a:t>.</a:t>
+                      </a:r>
+                      <a:endParaRPr lang="en-US" dirty="0"/>
+                    </a:p>
+                  </a:txBody>
+                  <a:tcPr/>
+                </a:tc>
+              </a:tr>
+              <a:tr h="1316545">
+                <a:tc>
+                  <a:txBody>
+                    <a:bodyPr/>
+                    <a:lstStyle/>
+                    <a:p>
+                      <a:r>
+                        <a:rPr lang="en-US" dirty="0" err="1" smtClean="0"/>
+                        <a:t>Risiko</a:t>
+                      </a:r>
+                      <a:r>
+                        <a:rPr lang="en-US" dirty="0" smtClean="0"/>
+                        <a:t> </a:t>
+                      </a:r>
+                      <a:r>
+                        <a:rPr lang="en-US" dirty="0" err="1" smtClean="0"/>
+                        <a:t>Penerimaan</a:t>
+                      </a:r>
+                      <a:r>
+                        <a:rPr lang="en-US" dirty="0" smtClean="0"/>
+                        <a:t> </a:t>
+                      </a:r>
+                      <a:r>
+                        <a:rPr lang="en-US" dirty="0" err="1" smtClean="0"/>
+                        <a:t>Pelanggan</a:t>
+                      </a:r>
+                      <a:r>
+                        <a:rPr lang="en-US" dirty="0" smtClean="0"/>
+                        <a:t> </a:t>
+                      </a:r>
+                      <a:r>
+                        <a:rPr lang="en-US" dirty="0" err="1" smtClean="0"/>
+                        <a:t>atas</a:t>
+                      </a:r>
+                      <a:r>
+                        <a:rPr lang="en-US" dirty="0" smtClean="0"/>
+                        <a:t> </a:t>
+                      </a:r>
+                      <a:r>
+                        <a:rPr lang="en-US" dirty="0" err="1" smtClean="0"/>
+                        <a:t>Produk</a:t>
+                      </a:r>
+                      <a:endParaRPr lang="en-US" dirty="0" smtClean="0"/>
+                    </a:p>
+                  </a:txBody>
+                  <a:tcPr/>
+                </a:tc>
+                <a:tc>
+                  <a:txBody>
+                    <a:bodyPr/>
+                    <a:lstStyle/>
+                    <a:p>
+                      <a:pPr marL="406400" lvl="2" indent="-342900">
+                        <a:buAutoNum type="arabicPeriod"/>
+                        <a:tabLst/>
+                      </a:pPr>
+                      <a:r>
+                        <a:rPr lang="id-ID" sz="1800" kern="1200" dirty="0" smtClean="0">
+                          <a:solidFill>
+                            <a:schemeClr val="dk1"/>
+                          </a:solidFill>
+                          <a:effectLst/>
+                          <a:latin typeface="+mn-lt"/>
+                          <a:ea typeface="+mn-ea"/>
+                          <a:cs typeface="+mn-cs"/>
+                        </a:rPr>
+                        <a:t>Pelanggan menolak s</a:t>
+                      </a:r>
+                      <a:r>
+                        <a:rPr lang="en-US" sz="1800" kern="1200" dirty="0" err="1" smtClean="0">
+                          <a:solidFill>
+                            <a:schemeClr val="dk1"/>
+                          </a:solidFill>
+                          <a:effectLst/>
+                          <a:latin typeface="+mn-lt"/>
+                          <a:ea typeface="+mn-ea"/>
+                          <a:cs typeface="+mn-cs"/>
+                        </a:rPr>
+                        <a:t>i</a:t>
+                      </a:r>
+                      <a:r>
+                        <a:rPr lang="id-ID" sz="1800" kern="1200" dirty="0" smtClean="0">
+                          <a:solidFill>
+                            <a:schemeClr val="dk1"/>
+                          </a:solidFill>
+                          <a:effectLst/>
+                          <a:latin typeface="+mn-lt"/>
+                          <a:ea typeface="+mn-ea"/>
+                          <a:cs typeface="+mn-cs"/>
+                        </a:rPr>
+                        <a:t>stem</a:t>
+                      </a:r>
+                      <a:r>
+                        <a:rPr lang="en-US" sz="1800" kern="1200" dirty="0" smtClean="0">
+                          <a:solidFill>
+                            <a:schemeClr val="dk1"/>
+                          </a:solidFill>
+                          <a:effectLst/>
+                          <a:latin typeface="+mn-lt"/>
+                          <a:ea typeface="+mn-ea"/>
+                          <a:cs typeface="+mn-cs"/>
+                        </a:rPr>
+                        <a:t>.</a:t>
+                      </a:r>
+                    </a:p>
+                    <a:p>
+                      <a:pPr marL="406400" lvl="2" indent="-342900">
+                        <a:buAutoNum type="arabicPeriod"/>
+                        <a:tabLst/>
+                      </a:pPr>
+                      <a:r>
+                        <a:rPr lang="en-US" sz="1800" kern="1200" dirty="0" err="1" smtClean="0">
+                          <a:solidFill>
+                            <a:schemeClr val="dk1"/>
+                          </a:solidFill>
+                          <a:effectLst/>
+                          <a:latin typeface="+mn-lt"/>
+                          <a:ea typeface="+mn-ea"/>
+                          <a:cs typeface="+mn-cs"/>
+                        </a:rPr>
+                        <a:t>Pelanggan</a:t>
+                      </a:r>
+                      <a:r>
+                        <a:rPr lang="en-US" sz="1800" kern="1200" dirty="0" smtClean="0">
+                          <a:solidFill>
+                            <a:schemeClr val="dk1"/>
+                          </a:solidFill>
+                          <a:effectLst/>
+                          <a:latin typeface="+mn-lt"/>
+                          <a:ea typeface="+mn-ea"/>
+                          <a:cs typeface="+mn-cs"/>
+                        </a:rPr>
+                        <a:t> </a:t>
+                      </a:r>
+                      <a:r>
+                        <a:rPr lang="en-US" sz="1800" kern="1200" dirty="0" err="1" smtClean="0">
+                          <a:solidFill>
+                            <a:schemeClr val="dk1"/>
+                          </a:solidFill>
+                          <a:effectLst/>
+                          <a:latin typeface="+mn-lt"/>
+                          <a:ea typeface="+mn-ea"/>
+                          <a:cs typeface="+mn-cs"/>
+                        </a:rPr>
+                        <a:t>ingin</a:t>
+                      </a:r>
+                      <a:r>
+                        <a:rPr lang="en-US" sz="1800" kern="1200" dirty="0" smtClean="0">
+                          <a:solidFill>
+                            <a:schemeClr val="dk1"/>
+                          </a:solidFill>
+                          <a:effectLst/>
+                          <a:latin typeface="+mn-lt"/>
+                          <a:ea typeface="+mn-ea"/>
+                          <a:cs typeface="+mn-cs"/>
+                        </a:rPr>
+                        <a:t> </a:t>
+                      </a:r>
+                      <a:r>
+                        <a:rPr lang="en-US" sz="1800" kern="1200" dirty="0" err="1" smtClean="0">
+                          <a:solidFill>
+                            <a:schemeClr val="dk1"/>
+                          </a:solidFill>
+                          <a:effectLst/>
+                          <a:latin typeface="+mn-lt"/>
+                          <a:ea typeface="+mn-ea"/>
+                          <a:cs typeface="+mn-cs"/>
+                        </a:rPr>
+                        <a:t>menambahkan</a:t>
+                      </a:r>
+                      <a:r>
+                        <a:rPr lang="en-US" sz="1800" kern="1200" dirty="0" smtClean="0">
+                          <a:solidFill>
+                            <a:schemeClr val="dk1"/>
+                          </a:solidFill>
+                          <a:effectLst/>
+                          <a:latin typeface="+mn-lt"/>
+                          <a:ea typeface="+mn-ea"/>
+                          <a:cs typeface="+mn-cs"/>
+                        </a:rPr>
+                        <a:t> </a:t>
+                      </a:r>
+                      <a:r>
+                        <a:rPr lang="en-US" sz="1800" kern="1200" dirty="0" err="1" smtClean="0">
+                          <a:solidFill>
+                            <a:schemeClr val="dk1"/>
+                          </a:solidFill>
+                          <a:effectLst/>
+                          <a:latin typeface="+mn-lt"/>
+                          <a:ea typeface="+mn-ea"/>
+                          <a:cs typeface="+mn-cs"/>
+                        </a:rPr>
+                        <a:t>fitur</a:t>
+                      </a:r>
+                      <a:r>
+                        <a:rPr lang="en-US" sz="1800" kern="1200" dirty="0" smtClean="0">
+                          <a:solidFill>
+                            <a:schemeClr val="dk1"/>
+                          </a:solidFill>
+                          <a:effectLst/>
+                          <a:latin typeface="+mn-lt"/>
+                          <a:ea typeface="+mn-ea"/>
+                          <a:cs typeface="+mn-cs"/>
+                        </a:rPr>
+                        <a:t> </a:t>
+                      </a:r>
+                      <a:r>
+                        <a:rPr lang="en-US" sz="1800" kern="1200" dirty="0" err="1" smtClean="0">
+                          <a:solidFill>
+                            <a:schemeClr val="dk1"/>
+                          </a:solidFill>
+                          <a:effectLst/>
+                          <a:latin typeface="+mn-lt"/>
+                          <a:ea typeface="+mn-ea"/>
+                          <a:cs typeface="+mn-cs"/>
+                        </a:rPr>
+                        <a:t>baru</a:t>
+                      </a:r>
+                      <a:r>
+                        <a:rPr lang="en-US" sz="1800" kern="1200" dirty="0" smtClean="0">
+                          <a:solidFill>
+                            <a:schemeClr val="dk1"/>
+                          </a:solidFill>
+                          <a:effectLst/>
+                          <a:latin typeface="+mn-lt"/>
+                          <a:ea typeface="+mn-ea"/>
+                          <a:cs typeface="+mn-cs"/>
+                        </a:rPr>
+                        <a:t> </a:t>
+                      </a:r>
+                      <a:r>
+                        <a:rPr lang="en-US" sz="1800" kern="1200" dirty="0" err="1" smtClean="0">
+                          <a:solidFill>
+                            <a:schemeClr val="dk1"/>
+                          </a:solidFill>
+                          <a:effectLst/>
+                          <a:latin typeface="+mn-lt"/>
+                          <a:ea typeface="+mn-ea"/>
+                          <a:cs typeface="+mn-cs"/>
+                        </a:rPr>
+                        <a:t>setelah</a:t>
+                      </a:r>
+                      <a:r>
+                        <a:rPr lang="en-US" sz="1800" kern="1200" dirty="0" smtClean="0">
+                          <a:solidFill>
+                            <a:schemeClr val="dk1"/>
+                          </a:solidFill>
+                          <a:effectLst/>
+                          <a:latin typeface="+mn-lt"/>
+                          <a:ea typeface="+mn-ea"/>
+                          <a:cs typeface="+mn-cs"/>
+                        </a:rPr>
+                        <a:t> </a:t>
+                      </a:r>
+                      <a:r>
+                        <a:rPr lang="en-US" sz="1800" kern="1200" dirty="0" err="1" smtClean="0">
+                          <a:solidFill>
+                            <a:schemeClr val="dk1"/>
+                          </a:solidFill>
+                          <a:effectLst/>
+                          <a:latin typeface="+mn-lt"/>
+                          <a:ea typeface="+mn-ea"/>
+                          <a:cs typeface="+mn-cs"/>
+                        </a:rPr>
+                        <a:t>sistem</a:t>
+                      </a:r>
+                      <a:r>
+                        <a:rPr lang="en-US" sz="1800" kern="1200" dirty="0" smtClean="0">
+                          <a:solidFill>
+                            <a:schemeClr val="dk1"/>
+                          </a:solidFill>
+                          <a:effectLst/>
+                          <a:latin typeface="+mn-lt"/>
+                          <a:ea typeface="+mn-ea"/>
+                          <a:cs typeface="+mn-cs"/>
+                        </a:rPr>
+                        <a:t> </a:t>
+                      </a:r>
+                      <a:r>
+                        <a:rPr lang="en-US" sz="1800" kern="1200" dirty="0" err="1" smtClean="0">
+                          <a:solidFill>
+                            <a:schemeClr val="dk1"/>
+                          </a:solidFill>
+                          <a:effectLst/>
+                          <a:latin typeface="+mn-lt"/>
+                          <a:ea typeface="+mn-ea"/>
+                          <a:cs typeface="+mn-cs"/>
+                        </a:rPr>
+                        <a:t>selesai</a:t>
+                      </a:r>
+                      <a:r>
+                        <a:rPr lang="en-US" sz="1800" kern="1200" dirty="0" smtClean="0">
+                          <a:solidFill>
+                            <a:schemeClr val="dk1"/>
+                          </a:solidFill>
+                          <a:effectLst/>
+                          <a:latin typeface="+mn-lt"/>
+                          <a:ea typeface="+mn-ea"/>
+                          <a:cs typeface="+mn-cs"/>
+                        </a:rPr>
+                        <a:t> </a:t>
+                      </a:r>
+                      <a:r>
+                        <a:rPr lang="en-US" sz="1800" kern="1200" dirty="0" err="1" smtClean="0">
+                          <a:solidFill>
+                            <a:schemeClr val="dk1"/>
+                          </a:solidFill>
+                          <a:effectLst/>
+                          <a:latin typeface="+mn-lt"/>
+                          <a:ea typeface="+mn-ea"/>
+                          <a:cs typeface="+mn-cs"/>
+                        </a:rPr>
+                        <a:t>dibuat</a:t>
+                      </a:r>
+                      <a:r>
+                        <a:rPr lang="en-US" sz="1800" kern="1200" dirty="0" smtClean="0">
+                          <a:solidFill>
+                            <a:schemeClr val="dk1"/>
+                          </a:solidFill>
+                          <a:effectLst/>
+                          <a:latin typeface="+mn-lt"/>
+                          <a:ea typeface="+mn-ea"/>
+                          <a:cs typeface="+mn-cs"/>
+                        </a:rPr>
+                        <a:t>.</a:t>
+                      </a:r>
+                      <a:endParaRPr lang="en-US" sz="1200" kern="1200" dirty="0" smtClean="0">
+                        <a:solidFill>
+                          <a:schemeClr val="dk1"/>
+                        </a:solidFill>
+                        <a:effectLst/>
+                        <a:latin typeface="+mn-lt"/>
+                        <a:ea typeface="+mn-ea"/>
+                        <a:cs typeface="+mn-cs"/>
+                      </a:endParaRPr>
+                    </a:p>
+                    <a:p>
+                      <a:pPr marL="406400" lvl="2" indent="-342900">
+                        <a:buAutoNum type="arabicPeriod"/>
+                        <a:tabLst/>
+                      </a:pPr>
+                      <a:r>
+                        <a:rPr lang="id-ID" sz="1800" kern="1200" dirty="0" smtClean="0">
+                          <a:solidFill>
+                            <a:schemeClr val="dk1"/>
+                          </a:solidFill>
+                          <a:effectLst/>
+                          <a:latin typeface="+mn-lt"/>
+                          <a:ea typeface="+mn-ea"/>
+                          <a:cs typeface="+mn-cs"/>
+                        </a:rPr>
+                        <a:t>Pelanggan kurang memahami proses perangkat lunak tersebut.</a:t>
+                      </a:r>
+                      <a:endParaRPr lang="en-US" sz="1200" kern="1200" dirty="0" smtClean="0">
+                        <a:solidFill>
+                          <a:schemeClr val="dk1"/>
+                        </a:solidFill>
+                        <a:effectLst/>
+                        <a:latin typeface="+mn-lt"/>
+                        <a:ea typeface="+mn-ea"/>
+                        <a:cs typeface="+mn-cs"/>
+                      </a:endParaRPr>
+                    </a:p>
+                    <a:p>
+                      <a:pPr marL="406400" lvl="2" indent="-342900">
+                        <a:buAutoNum type="arabicPeriod"/>
+                        <a:tabLst/>
+                      </a:pPr>
+                      <a:r>
+                        <a:rPr lang="id-ID" sz="1800" kern="1200" dirty="0" smtClean="0">
+                          <a:solidFill>
+                            <a:schemeClr val="dk1"/>
+                          </a:solidFill>
+                          <a:effectLst/>
+                          <a:latin typeface="+mn-lt"/>
+                          <a:ea typeface="+mn-ea"/>
+                          <a:cs typeface="+mn-cs"/>
+                        </a:rPr>
+                        <a:t>Pelanggan tidak yakin bahwa fungsionalitas yang diminta dapat dilakukan.</a:t>
+                      </a:r>
+                      <a:endParaRPr lang="en-US" dirty="0"/>
+                    </a:p>
+                  </a:txBody>
+                  <a:tcPr/>
+                </a:tc>
+              </a:tr>
+            </a:tbl>
+          </a:graphicData>
+        </a:graphic>
+      </p:graphicFrame>
+    </p:spTree>
+    <p:extLst>
+      <p:ext uri="{BB962C8B-B14F-4D97-AF65-F5344CB8AC3E}">
+        <p14:creationId xmlns:p14="http://schemas.microsoft.com/office/powerpoint/2010/main" val="565765168"/>
+      </p:ext>
+    </p:extLst>
+  </p:cSld>
+  <p:clrMapOvr>
+    <a:masterClrMapping/>
+  </p:clrMapOvr>
+  <p:timing>
+    <p:tnLst>
+      <p:par>
+        <p:cTn id="1" dur="indefinite" restart="never" nodeType="tmRoot"/>
+      </p:par>
+    </p:tnLst>
+  </p:timing>
+</p:sld>
+</file>
+
+<file path=ppt/slides/slide11.xml><?xml version="1.0" encoding="utf-8"?>
 <p:sld xmlns:a="http://schemas.openxmlformats.org/drawingml/2006/main" xmlns:r="http://schemas.openxmlformats.org/officeDocument/2006/relationships" xmlns:p="http://schemas.openxmlformats.org/presentationml/2006/main">
   <p:cSld>
     <p:spTree>
@@ -6592,9 +8644,19 @@
                 <a:latin typeface="Arial" panose="020B0604020202020204" pitchFamily="34" charset="0"/>
                 <a:cs typeface="Arial" panose="020B0604020202020204" pitchFamily="34" charset="0"/>
               </a:rPr>
-              <a:t>TOOLS</a:t>
-            </a:r>
-            <a:endParaRPr lang="en-US" dirty="0">
+              <a:t>TIME</a:t>
+            </a:r>
+            <a:r>
+              <a:rPr lang="en-US" b="1" dirty="0" smtClean="0">
+                <a:solidFill>
+                  <a:srgbClr val="E9410D"/>
+                </a:solidFill>
+                <a:latin typeface="Arial" panose="020B0604020202020204" pitchFamily="34" charset="0"/>
+                <a:cs typeface="Arial" panose="020B0604020202020204" pitchFamily="34" charset="0"/>
+              </a:rPr>
+              <a:t>LINE</a:t>
+            </a:r>
+            <a:endParaRPr lang="en-US" b="1" dirty="0">
               <a:solidFill>
                 <a:srgbClr val="E9410D"/>
               </a:solidFill>
@@ -6652,286 +8714,70 @@
           </a:p>
         </p:txBody>
       </p:sp>
-      <p:graphicFrame>
-        <p:nvGraphicFramePr>
-          <p:cNvPr id="3" name="Table 2"/>
-          <p:cNvGraphicFramePr>
-            <a:graphicFrameLocks noGrp="1"/>
-          </p:cNvGraphicFramePr>
-          <p:nvPr>
-            <p:extLst>
-              <p:ext uri="{D42A27DB-BD31-4B8C-83A1-F6EECF244321}">
-                <p14:modId xmlns:p14="http://schemas.microsoft.com/office/powerpoint/2010/main" val="2368401847"/>
-              </p:ext>
-            </p:extLst>
-          </p:nvPr>
-        </p:nvGraphicFramePr>
-        <p:xfrm>
-          <a:off x="1708443" y="1730327"/>
-          <a:ext cx="9700456" cy="3312940"/>
-        </p:xfrm>
-        <a:graphic>
-          <a:graphicData uri="http://schemas.openxmlformats.org/drawingml/2006/table">
-            <a:tbl>
-              <a:tblPr firstRow="1" bandRow="1">
-                <a:tableStyleId>{21E4AEA4-8DFA-4A89-87EB-49C32662AFE0}</a:tableStyleId>
-              </a:tblPr>
-              <a:tblGrid>
-                <a:gridCol w="3918634"/>
-                <a:gridCol w="5781822"/>
-              </a:tblGrid>
-              <a:tr h="569740">
-                <a:tc>
-                  <a:txBody>
-                    <a:bodyPr/>
-                    <a:lstStyle/>
-                    <a:p>
-                      <a:pPr algn="ctr"/>
-                      <a:r>
-                        <a:rPr lang="en-US" sz="2400" dirty="0" smtClean="0"/>
-                        <a:t>JENIS TOOLS</a:t>
-                      </a:r>
-                      <a:endParaRPr lang="en-US" sz="2400" dirty="0"/>
-                    </a:p>
-                  </a:txBody>
-                  <a:tcPr/>
-                </a:tc>
-                <a:tc>
-                  <a:txBody>
-                    <a:bodyPr/>
-                    <a:lstStyle/>
-                    <a:p>
-                      <a:pPr algn="ctr"/>
-                      <a:r>
-                        <a:rPr lang="en-US" sz="2400" dirty="0" smtClean="0"/>
-                        <a:t>NAMA</a:t>
-                      </a:r>
-                      <a:r>
-                        <a:rPr lang="en-US" sz="2400" baseline="0" dirty="0" smtClean="0"/>
-                        <a:t> TOOLS</a:t>
-                      </a:r>
-                      <a:endParaRPr lang="en-US" sz="2400" dirty="0"/>
-                    </a:p>
-                  </a:txBody>
-                  <a:tcPr/>
-                </a:tc>
-              </a:tr>
-              <a:tr h="457200">
-                <a:tc>
-                  <a:txBody>
-                    <a:bodyPr/>
-                    <a:lstStyle/>
-                    <a:p>
-                      <a:r>
-                        <a:rPr lang="en-US" dirty="0" err="1" smtClean="0"/>
-                        <a:t>Dev</a:t>
-                      </a:r>
-                      <a:r>
-                        <a:rPr lang="en-US" dirty="0" smtClean="0"/>
-                        <a:t> Tools</a:t>
-                      </a:r>
-                      <a:endParaRPr lang="en-US" baseline="0" dirty="0" smtClean="0"/>
-                    </a:p>
-                  </a:txBody>
-                  <a:tcPr/>
-                </a:tc>
-                <a:tc>
-                  <a:txBody>
-                    <a:bodyPr/>
-                    <a:lstStyle/>
-                    <a:p>
-                      <a:r>
-                        <a:rPr lang="en-US" dirty="0" smtClean="0"/>
-                        <a:t>Sublime Text, Brackets</a:t>
-                      </a:r>
-                      <a:endParaRPr lang="en-US" dirty="0"/>
-                    </a:p>
-                  </a:txBody>
-                  <a:tcPr/>
-                </a:tc>
-              </a:tr>
-              <a:tr h="457200">
-                <a:tc>
-                  <a:txBody>
-                    <a:bodyPr/>
-                    <a:lstStyle/>
-                    <a:p>
-                      <a:r>
-                        <a:rPr lang="en-US" dirty="0" smtClean="0"/>
-                        <a:t>Repository</a:t>
-                      </a:r>
-                      <a:endParaRPr lang="en-US" baseline="0" dirty="0" smtClean="0"/>
-                    </a:p>
-                  </a:txBody>
-                  <a:tcPr/>
-                </a:tc>
-                <a:tc>
-                  <a:txBody>
-                    <a:bodyPr/>
-                    <a:lstStyle/>
-                    <a:p>
-                      <a:r>
-                        <a:rPr lang="en-US" dirty="0" err="1" smtClean="0"/>
-                        <a:t>Git</a:t>
-                      </a:r>
-                      <a:r>
-                        <a:rPr lang="en-US" dirty="0" smtClean="0"/>
-                        <a:t> Hub</a:t>
-                      </a:r>
-                      <a:endParaRPr lang="en-US" dirty="0"/>
-                    </a:p>
-                  </a:txBody>
-                  <a:tcPr/>
-                </a:tc>
-              </a:tr>
-              <a:tr h="457200">
-                <a:tc>
-                  <a:txBody>
-                    <a:bodyPr/>
-                    <a:lstStyle/>
-                    <a:p>
-                      <a:r>
-                        <a:rPr lang="en-US" dirty="0" smtClean="0"/>
-                        <a:t>UI</a:t>
-                      </a:r>
-                      <a:endParaRPr lang="en-US" dirty="0"/>
-                    </a:p>
-                  </a:txBody>
-                  <a:tcPr/>
-                </a:tc>
-                <a:tc>
-                  <a:txBody>
-                    <a:bodyPr/>
-                    <a:lstStyle/>
-                    <a:p>
-                      <a:r>
-                        <a:rPr lang="en-US" dirty="0" smtClean="0"/>
-                        <a:t>Adobe Photoshop</a:t>
-                      </a:r>
-                      <a:r>
-                        <a:rPr lang="en-US" baseline="0" dirty="0" smtClean="0"/>
-                        <a:t> </a:t>
-                      </a:r>
-                      <a:endParaRPr lang="en-US" dirty="0"/>
-                    </a:p>
-                  </a:txBody>
-                  <a:tcPr/>
-                </a:tc>
-              </a:tr>
-              <a:tr h="457200">
-                <a:tc>
-                  <a:txBody>
-                    <a:bodyPr/>
-                    <a:lstStyle/>
-                    <a:p>
-                      <a:r>
-                        <a:rPr lang="en-US" dirty="0" smtClean="0"/>
-                        <a:t>DB Designer</a:t>
-                      </a:r>
-                      <a:endParaRPr lang="en-US" dirty="0"/>
-                    </a:p>
-                  </a:txBody>
-                  <a:tcPr/>
-                </a:tc>
-                <a:tc>
-                  <a:txBody>
-                    <a:bodyPr/>
-                    <a:lstStyle/>
-                    <a:p>
-                      <a:r>
-                        <a:rPr lang="en-US" dirty="0" smtClean="0"/>
-                        <a:t>Power Designer</a:t>
-                      </a:r>
-                      <a:endParaRPr lang="en-US" dirty="0"/>
-                    </a:p>
-                  </a:txBody>
-                  <a:tcPr/>
-                </a:tc>
-              </a:tr>
-              <a:tr h="457200">
-                <a:tc>
-                  <a:txBody>
-                    <a:bodyPr/>
-                    <a:lstStyle/>
-                    <a:p>
-                      <a:r>
-                        <a:rPr lang="en-US" dirty="0" smtClean="0"/>
-                        <a:t>DBMS</a:t>
-                      </a:r>
-                      <a:endParaRPr lang="en-US" dirty="0"/>
-                    </a:p>
-                  </a:txBody>
-                  <a:tcPr/>
-                </a:tc>
-                <a:tc>
-                  <a:txBody>
-                    <a:bodyPr/>
-                    <a:lstStyle/>
-                    <a:p>
-                      <a:r>
-                        <a:rPr lang="en-US" dirty="0" smtClean="0"/>
-                        <a:t>MySQL</a:t>
-                      </a:r>
-                      <a:endParaRPr lang="en-US" dirty="0"/>
-                    </a:p>
-                  </a:txBody>
-                  <a:tcPr/>
-                </a:tc>
-              </a:tr>
-              <a:tr h="457200">
-                <a:tc>
-                  <a:txBody>
-                    <a:bodyPr/>
-                    <a:lstStyle/>
-                    <a:p>
-                      <a:r>
-                        <a:rPr lang="en-US" dirty="0" smtClean="0"/>
-                        <a:t>Tool </a:t>
-                      </a:r>
-                      <a:r>
-                        <a:rPr lang="en-US" dirty="0" err="1" smtClean="0"/>
-                        <a:t>Lainnya</a:t>
-                      </a:r>
-                      <a:endParaRPr lang="en-US" dirty="0"/>
-                    </a:p>
-                  </a:txBody>
-                  <a:tcPr/>
-                </a:tc>
-                <a:tc>
-                  <a:txBody>
-                    <a:bodyPr/>
-                    <a:lstStyle/>
-                    <a:p>
-                      <a:r>
-                        <a:rPr lang="en-US" dirty="0" smtClean="0"/>
-                        <a:t>XAMPP, Apache, </a:t>
-                      </a:r>
-                      <a:r>
-                        <a:rPr lang="en-US" dirty="0" err="1" smtClean="0"/>
-                        <a:t>Git</a:t>
-                      </a:r>
-                      <a:r>
-                        <a:rPr lang="en-US" dirty="0" smtClean="0"/>
-                        <a:t> Bash, Ms.</a:t>
-                      </a:r>
-                      <a:r>
-                        <a:rPr lang="en-US" baseline="0" dirty="0" smtClean="0"/>
-                        <a:t> Project</a:t>
-                      </a:r>
-                      <a:endParaRPr lang="en-US" dirty="0"/>
-                    </a:p>
-                  </a:txBody>
-                  <a:tcPr/>
-                </a:tc>
-              </a:tr>
-            </a:tbl>
-          </a:graphicData>
-        </a:graphic>
-      </p:graphicFrame>
+      <p:pic>
+        <p:nvPicPr>
+          <p:cNvPr id="5" name="Picture 4"/>
+          <p:cNvPicPr>
+            <a:picLocks noChangeAspect="1"/>
+          </p:cNvPicPr>
+          <p:nvPr/>
+        </p:nvPicPr>
+        <p:blipFill>
+          <a:blip r:embed="rId2">
+            <a:extLst>
+              <a:ext uri="{28A0092B-C50C-407E-A947-70E740481C1C}">
+                <a14:useLocalDpi xmlns:a14="http://schemas.microsoft.com/office/drawing/2010/main" val="0"/>
+              </a:ext>
+            </a:extLst>
+          </a:blip>
+          <a:stretch>
+            <a:fillRect/>
+          </a:stretch>
+        </p:blipFill>
+        <p:spPr>
+          <a:xfrm>
+            <a:off x="3995460" y="199424"/>
+            <a:ext cx="6492320" cy="1987445"/>
+          </a:xfrm>
+          <a:prstGeom prst="rect">
+            <a:avLst/>
+          </a:prstGeom>
+        </p:spPr>
+      </p:pic>
+      <p:pic>
+        <p:nvPicPr>
+          <p:cNvPr id="6" name="Picture 5"/>
+          <p:cNvPicPr>
+            <a:picLocks noChangeAspect="1"/>
+          </p:cNvPicPr>
+          <p:nvPr/>
+        </p:nvPicPr>
+        <p:blipFill>
+          <a:blip r:embed="rId3">
+            <a:extLst>
+              <a:ext uri="{28A0092B-C50C-407E-A947-70E740481C1C}">
+                <a14:useLocalDpi xmlns:a14="http://schemas.microsoft.com/office/drawing/2010/main" val="0"/>
+              </a:ext>
+            </a:extLst>
+          </a:blip>
+          <a:stretch>
+            <a:fillRect/>
+          </a:stretch>
+        </p:blipFill>
+        <p:spPr>
+          <a:xfrm>
+            <a:off x="4222665" y="2200316"/>
+            <a:ext cx="6265285" cy="4442531"/>
+          </a:xfrm>
+          <a:prstGeom prst="rect">
+            <a:avLst/>
+          </a:prstGeom>
+        </p:spPr>
+      </p:pic>
     </p:spTree>
     <p:extLst>
       <p:ext uri="{BB962C8B-B14F-4D97-AF65-F5344CB8AC3E}">
-        <p14:creationId xmlns:p14="http://schemas.microsoft.com/office/powerpoint/2010/main" val="71268372"/>
+        <p14:creationId xmlns:p14="http://schemas.microsoft.com/office/powerpoint/2010/main" val="2182101088"/>
       </p:ext>
     </p:extLst>
   </p:cSld>
@@ -7001,7 +8847,7 @@
                 <a:latin typeface="Arial" panose="020B0604020202020204" pitchFamily="34" charset="0"/>
                 <a:cs typeface="Arial" panose="020B0604020202020204" pitchFamily="34" charset="0"/>
               </a:rPr>
-              <a:t>RISIKO</a:t>
+              <a:t>TOOLS</a:t>
             </a:r>
             <a:endParaRPr lang="en-US" dirty="0">
               <a:solidFill>
@@ -7070,14 +8916,14 @@
           <p:nvPr>
             <p:extLst>
               <p:ext uri="{D42A27DB-BD31-4B8C-83A1-F6EECF244321}">
-                <p14:modId xmlns:p14="http://schemas.microsoft.com/office/powerpoint/2010/main" val="2292707057"/>
+                <p14:modId xmlns:p14="http://schemas.microsoft.com/office/powerpoint/2010/main" val="2368401847"/>
               </p:ext>
             </p:extLst>
           </p:nvPr>
         </p:nvGraphicFramePr>
         <p:xfrm>
-          <a:off x="1345585" y="1553028"/>
-          <a:ext cx="10686758" cy="5138058"/>
+          <a:off x="1708443" y="1730327"/>
+          <a:ext cx="9700456" cy="3312940"/>
         </p:xfrm>
         <a:graphic>
           <a:graphicData uri="http://schemas.openxmlformats.org/drawingml/2006/table">
@@ -7086,10 +8932,10 @@
                 <a:tableStyleId>{21E4AEA4-8DFA-4A89-87EB-49C32662AFE0}</a:tableStyleId>
               </a:tblPr>
               <a:tblGrid>
-                <a:gridCol w="2792719"/>
-                <a:gridCol w="7894039"/>
+                <a:gridCol w="3918634"/>
+                <a:gridCol w="5781822"/>
               </a:tblGrid>
-              <a:tr h="331413">
+              <a:tr h="569740">
                 <a:tc>
                   <a:txBody>
                     <a:bodyPr/>
@@ -7098,7 +8944,7 @@
                       <a:pPr algn="ctr"/>
                       <a:r>
                         <a:rPr lang="en-US" sz="2400" dirty="0" smtClean="0"/>
-                        <a:t>JENIS RISIKO</a:t>
+                        <a:t>JENIS TOOLS</a:t>
                       </a:r>
                       <a:endParaRPr lang="en-US" sz="2400" dirty="0"/>
                     </a:p>
@@ -7113,7 +8959,11 @@
                       <a:pPr algn="ctr"/>
                       <a:r>
                         <a:rPr lang="en-US" sz="2400" dirty="0" smtClean="0"/>
-                        <a:t>DETAIL</a:t>
+                        <a:t>NAMA</a:t>
+                      </a:r>
+                      <a:r>
+                        <a:rPr lang="en-US" sz="2400" baseline="0" dirty="0" smtClean="0"/>
+                        <a:t> TOOLS</a:t>
                       </a:r>
                       <a:endParaRPr lang="en-US" sz="2400" dirty="0"/>
                     </a:p>
@@ -7121,7 +8971,7 @@
                   <a:tcPr/>
                 </a:tc>
               </a:tr>
-              <a:tr h="986873">
+              <a:tr h="457200">
                 <a:tc>
                   <a:txBody>
                     <a:bodyPr/>
@@ -7129,15 +8979,11 @@
                     <a:p>
                       <a:r>
                         <a:rPr lang="en-US" dirty="0" err="1" smtClean="0"/>
-                        <a:t>Risiko</a:t>
-                      </a:r>
-                      <a:r>
-                        <a:rPr lang="en-US" baseline="0" dirty="0" smtClean="0"/>
-                        <a:t> </a:t>
-                      </a:r>
-                      <a:r>
-                        <a:rPr lang="en-US" baseline="0" dirty="0" err="1" smtClean="0"/>
-                        <a:t>Kontraktual</a:t>
+                        <a:t>Dev</a:t>
+                      </a:r>
+                      <a:r>
+                        <a:rPr lang="en-US" dirty="0" smtClean="0"/>
+                        <a:t> Tools</a:t>
                       </a:r>
                       <a:endParaRPr lang="en-US" baseline="0" dirty="0" smtClean="0"/>
                     </a:p>
@@ -7149,416 +8995,25 @@
                     <a:bodyPr/>
                     <a:lstStyle/>
                     <a:p>
-                      <a:pPr marL="406400" lvl="2" indent="-342900" algn="l">
-                        <a:buAutoNum type="arabicPeriod"/>
-                      </a:pPr>
-                      <a:r>
-                        <a:rPr lang="en-GB" sz="1800" kern="1200" dirty="0" err="1" smtClean="0">
-                          <a:solidFill>
-                            <a:schemeClr val="dk1"/>
-                          </a:solidFill>
-                          <a:effectLst/>
-                          <a:latin typeface="+mn-lt"/>
-                          <a:ea typeface="+mn-ea"/>
-                          <a:cs typeface="+mn-cs"/>
-                        </a:rPr>
-                        <a:t>Kebutuhan</a:t>
-                      </a:r>
-                      <a:r>
-                        <a:rPr lang="en-GB" sz="1800" kern="1200" dirty="0" smtClean="0">
-                          <a:solidFill>
-                            <a:schemeClr val="dk1"/>
-                          </a:solidFill>
-                          <a:effectLst/>
-                          <a:latin typeface="+mn-lt"/>
-                          <a:ea typeface="+mn-ea"/>
-                          <a:cs typeface="+mn-cs"/>
-                        </a:rPr>
-                        <a:t> </a:t>
-                      </a:r>
-                      <a:r>
-                        <a:rPr lang="en-GB" sz="1800" kern="1200" dirty="0" err="1" smtClean="0">
-                          <a:solidFill>
-                            <a:schemeClr val="dk1"/>
-                          </a:solidFill>
-                          <a:effectLst/>
-                          <a:latin typeface="+mn-lt"/>
-                          <a:ea typeface="+mn-ea"/>
-                          <a:cs typeface="+mn-cs"/>
-                        </a:rPr>
-                        <a:t>pelanggan</a:t>
-                      </a:r>
-                      <a:r>
-                        <a:rPr lang="en-GB" sz="1800" kern="1200" dirty="0" smtClean="0">
-                          <a:solidFill>
-                            <a:schemeClr val="dk1"/>
-                          </a:solidFill>
-                          <a:effectLst/>
-                          <a:latin typeface="+mn-lt"/>
-                          <a:ea typeface="+mn-ea"/>
-                          <a:cs typeface="+mn-cs"/>
-                        </a:rPr>
-                        <a:t> yang </a:t>
-                      </a:r>
-                      <a:r>
-                        <a:rPr lang="en-GB" sz="1800" kern="1200" dirty="0" err="1" smtClean="0">
-                          <a:solidFill>
-                            <a:schemeClr val="dk1"/>
-                          </a:solidFill>
-                          <a:effectLst/>
-                          <a:latin typeface="+mn-lt"/>
-                          <a:ea typeface="+mn-ea"/>
-                          <a:cs typeface="+mn-cs"/>
-                        </a:rPr>
-                        <a:t>berubah</a:t>
-                      </a:r>
-                      <a:r>
-                        <a:rPr lang="en-GB" sz="1800" kern="1200" dirty="0" smtClean="0">
-                          <a:solidFill>
-                            <a:schemeClr val="dk1"/>
-                          </a:solidFill>
-                          <a:effectLst/>
-                          <a:latin typeface="+mn-lt"/>
-                          <a:ea typeface="+mn-ea"/>
-                          <a:cs typeface="+mn-cs"/>
-                        </a:rPr>
-                        <a:t> / </a:t>
-                      </a:r>
-                      <a:r>
-                        <a:rPr lang="en-GB" sz="1800" kern="1200" dirty="0" err="1" smtClean="0">
-                          <a:solidFill>
-                            <a:schemeClr val="dk1"/>
-                          </a:solidFill>
-                          <a:effectLst/>
-                          <a:latin typeface="+mn-lt"/>
-                          <a:ea typeface="+mn-ea"/>
-                          <a:cs typeface="+mn-cs"/>
-                        </a:rPr>
-                        <a:t>bertambah</a:t>
-                      </a:r>
-                      <a:r>
-                        <a:rPr lang="en-GB" sz="1800" kern="1200" dirty="0" smtClean="0">
-                          <a:solidFill>
-                            <a:schemeClr val="dk1"/>
-                          </a:solidFill>
-                          <a:effectLst/>
-                          <a:latin typeface="+mn-lt"/>
-                          <a:ea typeface="+mn-ea"/>
-                          <a:cs typeface="+mn-cs"/>
-                        </a:rPr>
-                        <a:t>, yang </a:t>
-                      </a:r>
-                      <a:r>
-                        <a:rPr lang="en-GB" sz="1800" kern="1200" dirty="0" err="1" smtClean="0">
-                          <a:solidFill>
-                            <a:schemeClr val="dk1"/>
-                          </a:solidFill>
-                          <a:effectLst/>
-                          <a:latin typeface="+mn-lt"/>
-                          <a:ea typeface="+mn-ea"/>
-                          <a:cs typeface="+mn-cs"/>
-                        </a:rPr>
-                        <a:t>mempengaruhi</a:t>
-                      </a:r>
-                      <a:r>
-                        <a:rPr lang="en-GB" sz="1800" kern="1200" dirty="0" smtClean="0">
-                          <a:solidFill>
-                            <a:schemeClr val="dk1"/>
-                          </a:solidFill>
-                          <a:effectLst/>
-                          <a:latin typeface="+mn-lt"/>
-                          <a:ea typeface="+mn-ea"/>
-                          <a:cs typeface="+mn-cs"/>
-                        </a:rPr>
-                        <a:t> </a:t>
-                      </a:r>
-                      <a:r>
-                        <a:rPr lang="en-GB" sz="1800" kern="1200" dirty="0" err="1" smtClean="0">
-                          <a:solidFill>
-                            <a:schemeClr val="dk1"/>
-                          </a:solidFill>
-                          <a:effectLst/>
-                          <a:latin typeface="+mn-lt"/>
-                          <a:ea typeface="+mn-ea"/>
-                          <a:cs typeface="+mn-cs"/>
-                        </a:rPr>
-                        <a:t>pengembangan</a:t>
-                      </a:r>
-                      <a:r>
-                        <a:rPr lang="en-GB" sz="1800" kern="1200" dirty="0" smtClean="0">
-                          <a:solidFill>
-                            <a:schemeClr val="dk1"/>
-                          </a:solidFill>
-                          <a:effectLst/>
-                          <a:latin typeface="+mn-lt"/>
-                          <a:ea typeface="+mn-ea"/>
-                          <a:cs typeface="+mn-cs"/>
-                        </a:rPr>
-                        <a:t> </a:t>
-                      </a:r>
-                      <a:r>
-                        <a:rPr lang="en-GB" sz="1800" kern="1200" dirty="0" err="1" smtClean="0">
-                          <a:solidFill>
-                            <a:schemeClr val="dk1"/>
-                          </a:solidFill>
-                          <a:effectLst/>
-                          <a:latin typeface="+mn-lt"/>
-                          <a:ea typeface="+mn-ea"/>
-                          <a:cs typeface="+mn-cs"/>
-                        </a:rPr>
-                        <a:t>perangkat</a:t>
-                      </a:r>
-                      <a:r>
-                        <a:rPr lang="en-GB" sz="1800" kern="1200" dirty="0" smtClean="0">
-                          <a:solidFill>
-                            <a:schemeClr val="dk1"/>
-                          </a:solidFill>
-                          <a:effectLst/>
-                          <a:latin typeface="+mn-lt"/>
-                          <a:ea typeface="+mn-ea"/>
-                          <a:cs typeface="+mn-cs"/>
-                        </a:rPr>
-                        <a:t> </a:t>
-                      </a:r>
-                      <a:r>
-                        <a:rPr lang="en-GB" sz="1800" kern="1200" dirty="0" err="1" smtClean="0">
-                          <a:solidFill>
-                            <a:schemeClr val="dk1"/>
-                          </a:solidFill>
-                          <a:effectLst/>
-                          <a:latin typeface="+mn-lt"/>
-                          <a:ea typeface="+mn-ea"/>
-                          <a:cs typeface="+mn-cs"/>
-                        </a:rPr>
-                        <a:t>lunak</a:t>
-                      </a:r>
-                      <a:r>
-                        <a:rPr lang="en-GB" sz="1800" kern="1200" dirty="0" smtClean="0">
-                          <a:solidFill>
-                            <a:schemeClr val="dk1"/>
-                          </a:solidFill>
-                          <a:effectLst/>
-                          <a:latin typeface="+mn-lt"/>
-                          <a:ea typeface="+mn-ea"/>
-                          <a:cs typeface="+mn-cs"/>
-                        </a:rPr>
-                        <a:t>.</a:t>
-                      </a:r>
-                      <a:endParaRPr lang="en-US" sz="1200" kern="1200" dirty="0" smtClean="0">
-                        <a:solidFill>
-                          <a:schemeClr val="dk1"/>
-                        </a:solidFill>
-                        <a:effectLst/>
-                        <a:latin typeface="+mn-lt"/>
-                        <a:ea typeface="+mn-ea"/>
-                        <a:cs typeface="+mn-cs"/>
-                      </a:endParaRPr>
-                    </a:p>
-                    <a:p>
-                      <a:pPr marL="406400" lvl="2" indent="-342900" algn="l">
-                        <a:buAutoNum type="arabicPeriod"/>
-                      </a:pPr>
-                      <a:r>
-                        <a:rPr lang="en-GB" sz="1800" kern="1200" dirty="0" err="1" smtClean="0">
-                          <a:solidFill>
-                            <a:schemeClr val="dk1"/>
-                          </a:solidFill>
-                          <a:effectLst/>
-                          <a:latin typeface="+mn-lt"/>
-                          <a:ea typeface="+mn-ea"/>
-                          <a:cs typeface="+mn-cs"/>
-                        </a:rPr>
-                        <a:t>Spesifikasi</a:t>
-                      </a:r>
-                      <a:r>
-                        <a:rPr lang="en-GB" sz="1800" kern="1200" dirty="0" smtClean="0">
-                          <a:solidFill>
-                            <a:schemeClr val="dk1"/>
-                          </a:solidFill>
-                          <a:effectLst/>
-                          <a:latin typeface="+mn-lt"/>
-                          <a:ea typeface="+mn-ea"/>
-                          <a:cs typeface="+mn-cs"/>
-                        </a:rPr>
-                        <a:t> </a:t>
-                      </a:r>
-                      <a:r>
-                        <a:rPr lang="en-GB" sz="1800" kern="1200" dirty="0" err="1" smtClean="0">
-                          <a:solidFill>
-                            <a:schemeClr val="dk1"/>
-                          </a:solidFill>
-                          <a:effectLst/>
-                          <a:latin typeface="+mn-lt"/>
-                          <a:ea typeface="+mn-ea"/>
-                          <a:cs typeface="+mn-cs"/>
-                        </a:rPr>
-                        <a:t>persyaratan</a:t>
-                      </a:r>
-                      <a:r>
-                        <a:rPr lang="en-GB" sz="1800" kern="1200" dirty="0" smtClean="0">
-                          <a:solidFill>
-                            <a:schemeClr val="dk1"/>
-                          </a:solidFill>
-                          <a:effectLst/>
-                          <a:latin typeface="+mn-lt"/>
-                          <a:ea typeface="+mn-ea"/>
-                          <a:cs typeface="+mn-cs"/>
-                        </a:rPr>
-                        <a:t> </a:t>
-                      </a:r>
-                      <a:r>
-                        <a:rPr lang="en-GB" sz="1800" kern="1200" dirty="0" err="1" smtClean="0">
-                          <a:solidFill>
-                            <a:schemeClr val="dk1"/>
-                          </a:solidFill>
-                          <a:effectLst/>
-                          <a:latin typeface="+mn-lt"/>
-                          <a:ea typeface="+mn-ea"/>
-                          <a:cs typeface="+mn-cs"/>
-                        </a:rPr>
-                        <a:t>pelanggan</a:t>
-                      </a:r>
-                      <a:r>
-                        <a:rPr lang="en-GB" sz="1800" kern="1200" dirty="0" smtClean="0">
-                          <a:solidFill>
-                            <a:schemeClr val="dk1"/>
-                          </a:solidFill>
-                          <a:effectLst/>
-                          <a:latin typeface="+mn-lt"/>
-                          <a:ea typeface="+mn-ea"/>
-                          <a:cs typeface="+mn-cs"/>
-                        </a:rPr>
-                        <a:t> </a:t>
-                      </a:r>
-                      <a:r>
-                        <a:rPr lang="en-GB" sz="1800" kern="1200" dirty="0" err="1" smtClean="0">
-                          <a:solidFill>
-                            <a:schemeClr val="dk1"/>
-                          </a:solidFill>
-                          <a:effectLst/>
-                          <a:latin typeface="+mn-lt"/>
-                          <a:ea typeface="+mn-ea"/>
-                          <a:cs typeface="+mn-cs"/>
-                        </a:rPr>
-                        <a:t>kurang</a:t>
-                      </a:r>
-                      <a:r>
-                        <a:rPr lang="en-GB" sz="1800" kern="1200" dirty="0" smtClean="0">
-                          <a:solidFill>
-                            <a:schemeClr val="dk1"/>
-                          </a:solidFill>
-                          <a:effectLst/>
-                          <a:latin typeface="+mn-lt"/>
-                          <a:ea typeface="+mn-ea"/>
-                          <a:cs typeface="+mn-cs"/>
-                        </a:rPr>
-                        <a:t> </a:t>
-                      </a:r>
-                      <a:r>
-                        <a:rPr lang="en-GB" sz="1800" kern="1200" dirty="0" err="1" smtClean="0">
-                          <a:solidFill>
-                            <a:schemeClr val="dk1"/>
-                          </a:solidFill>
-                          <a:effectLst/>
-                          <a:latin typeface="+mn-lt"/>
-                          <a:ea typeface="+mn-ea"/>
-                          <a:cs typeface="+mn-cs"/>
-                        </a:rPr>
-                        <a:t>jelas</a:t>
-                      </a:r>
-                      <a:r>
-                        <a:rPr lang="en-GB" sz="1800" kern="1200" dirty="0" smtClean="0">
-                          <a:solidFill>
-                            <a:schemeClr val="dk1"/>
-                          </a:solidFill>
-                          <a:effectLst/>
-                          <a:latin typeface="+mn-lt"/>
-                          <a:ea typeface="+mn-ea"/>
-                          <a:cs typeface="+mn-cs"/>
-                        </a:rPr>
-                        <a:t>.</a:t>
-                      </a:r>
-                      <a:endParaRPr lang="en-US" sz="1200" kern="1200" dirty="0" smtClean="0">
-                        <a:solidFill>
-                          <a:schemeClr val="dk1"/>
-                        </a:solidFill>
-                        <a:effectLst/>
-                        <a:latin typeface="+mn-lt"/>
-                        <a:ea typeface="+mn-ea"/>
-                        <a:cs typeface="+mn-cs"/>
-                      </a:endParaRPr>
-                    </a:p>
-                    <a:p>
-                      <a:pPr marL="406400" lvl="2" indent="-342900" algn="l">
-                        <a:buAutoNum type="arabicPeriod"/>
-                      </a:pPr>
-                      <a:r>
-                        <a:rPr lang="id-ID" sz="1800" kern="1200" dirty="0" smtClean="0">
-                          <a:solidFill>
-                            <a:schemeClr val="dk1"/>
-                          </a:solidFill>
-                          <a:effectLst/>
-                          <a:latin typeface="+mn-lt"/>
-                          <a:ea typeface="+mn-ea"/>
-                          <a:cs typeface="+mn-cs"/>
-                        </a:rPr>
-                        <a:t>Penggalian kebutuhan </a:t>
-                      </a:r>
-                      <a:r>
-                        <a:rPr lang="en-US" sz="1800" kern="1200" dirty="0" err="1" smtClean="0">
-                          <a:solidFill>
-                            <a:schemeClr val="dk1"/>
-                          </a:solidFill>
-                          <a:effectLst/>
-                          <a:latin typeface="+mn-lt"/>
-                          <a:ea typeface="+mn-ea"/>
-                          <a:cs typeface="+mn-cs"/>
-                        </a:rPr>
-                        <a:t>pelanggan</a:t>
-                      </a:r>
-                      <a:r>
-                        <a:rPr lang="id-ID" sz="1800" kern="1200" dirty="0" smtClean="0">
-                          <a:solidFill>
-                            <a:schemeClr val="dk1"/>
-                          </a:solidFill>
-                          <a:effectLst/>
-                          <a:latin typeface="+mn-lt"/>
-                          <a:ea typeface="+mn-ea"/>
-                          <a:cs typeface="+mn-cs"/>
-                        </a:rPr>
-                        <a:t> yang terkendala komunikasi.</a:t>
-                      </a:r>
-                      <a:endParaRPr lang="en-US" sz="1200" kern="1200" dirty="0">
-                        <a:solidFill>
-                          <a:schemeClr val="dk1"/>
-                        </a:solidFill>
-                        <a:effectLst/>
-                        <a:latin typeface="+mn-lt"/>
-                        <a:ea typeface="+mn-ea"/>
-                        <a:cs typeface="+mn-cs"/>
-                      </a:endParaRPr>
+                      <a:r>
+                        <a:rPr lang="en-US" dirty="0" smtClean="0"/>
+                        <a:t>Sublime Text, Brackets</a:t>
+                      </a:r>
+                      <a:endParaRPr lang="en-US" dirty="0"/>
                     </a:p>
                   </a:txBody>
                   <a:tcPr/>
                 </a:tc>
               </a:tr>
-              <a:tr h="986873">
+              <a:tr h="457200">
                 <a:tc>
                   <a:txBody>
                     <a:bodyPr/>
                     <a:lstStyle/>
                     <a:p>
                       <a:r>
-                        <a:rPr lang="en-US" baseline="0" dirty="0" err="1" smtClean="0"/>
-                        <a:t>Risiko</a:t>
-                      </a:r>
-                      <a:r>
-                        <a:rPr lang="en-US" baseline="0" dirty="0" smtClean="0"/>
-                        <a:t> </a:t>
-                      </a:r>
-                      <a:r>
-                        <a:rPr lang="en-US" baseline="0" dirty="0" err="1" smtClean="0"/>
-                        <a:t>Teknis</a:t>
+                        <a:rPr lang="en-US" dirty="0" smtClean="0"/>
+                        <a:t>Repository</a:t>
                       </a:r>
                       <a:endParaRPr lang="en-US" baseline="0" dirty="0" smtClean="0"/>
                     </a:p>
@@ -7570,580 +9025,29 @@
                     <a:bodyPr/>
                     <a:lstStyle/>
                     <a:p>
-                      <a:pPr marL="406400" lvl="2" indent="-342900">
-                        <a:buAutoNum type="arabicPeriod"/>
-                      </a:pPr>
-                      <a:r>
-                        <a:rPr lang="en-GB" sz="1800" kern="1200" dirty="0" err="1" smtClean="0">
-                          <a:solidFill>
-                            <a:schemeClr val="dk1"/>
-                          </a:solidFill>
-                          <a:effectLst/>
-                          <a:latin typeface="+mn-lt"/>
-                          <a:ea typeface="+mn-ea"/>
-                          <a:cs typeface="+mn-cs"/>
-                        </a:rPr>
-                        <a:t>Kurang</a:t>
-                      </a:r>
-                      <a:r>
-                        <a:rPr lang="en-GB" sz="1800" kern="1200" dirty="0" smtClean="0">
-                          <a:solidFill>
-                            <a:schemeClr val="dk1"/>
-                          </a:solidFill>
-                          <a:effectLst/>
-                          <a:latin typeface="+mn-lt"/>
-                          <a:ea typeface="+mn-ea"/>
-                          <a:cs typeface="+mn-cs"/>
-                        </a:rPr>
-                        <a:t> </a:t>
-                      </a:r>
-                      <a:r>
-                        <a:rPr lang="en-GB" sz="1800" kern="1200" dirty="0" err="1" smtClean="0">
-                          <a:solidFill>
-                            <a:schemeClr val="dk1"/>
-                          </a:solidFill>
-                          <a:effectLst/>
-                          <a:latin typeface="+mn-lt"/>
-                          <a:ea typeface="+mn-ea"/>
-                          <a:cs typeface="+mn-cs"/>
-                        </a:rPr>
-                        <a:t>spesifiknya</a:t>
-                      </a:r>
-                      <a:r>
-                        <a:rPr lang="en-GB" sz="1800" kern="1200" dirty="0" smtClean="0">
-                          <a:solidFill>
-                            <a:schemeClr val="dk1"/>
-                          </a:solidFill>
-                          <a:effectLst/>
-                          <a:latin typeface="+mn-lt"/>
-                          <a:ea typeface="+mn-ea"/>
-                          <a:cs typeface="+mn-cs"/>
-                        </a:rPr>
-                        <a:t> </a:t>
-                      </a:r>
-                      <a:r>
-                        <a:rPr lang="en-GB" sz="1800" kern="1200" dirty="0" err="1" smtClean="0">
-                          <a:solidFill>
-                            <a:schemeClr val="dk1"/>
-                          </a:solidFill>
-                          <a:effectLst/>
-                          <a:latin typeface="+mn-lt"/>
-                          <a:ea typeface="+mn-ea"/>
-                          <a:cs typeface="+mn-cs"/>
-                        </a:rPr>
-                        <a:t>metode</a:t>
-                      </a:r>
-                      <a:r>
-                        <a:rPr lang="en-GB" sz="1800" kern="1200" dirty="0" smtClean="0">
-                          <a:solidFill>
-                            <a:schemeClr val="dk1"/>
-                          </a:solidFill>
-                          <a:effectLst/>
-                          <a:latin typeface="+mn-lt"/>
-                          <a:ea typeface="+mn-ea"/>
-                          <a:cs typeface="+mn-cs"/>
-                        </a:rPr>
-                        <a:t> yang </a:t>
-                      </a:r>
-                      <a:r>
-                        <a:rPr lang="en-GB" sz="1800" kern="1200" dirty="0" err="1" smtClean="0">
-                          <a:solidFill>
-                            <a:schemeClr val="dk1"/>
-                          </a:solidFill>
-                          <a:effectLst/>
-                          <a:latin typeface="+mn-lt"/>
-                          <a:ea typeface="+mn-ea"/>
-                          <a:cs typeface="+mn-cs"/>
-                        </a:rPr>
-                        <a:t>digunakan</a:t>
-                      </a:r>
-                      <a:r>
-                        <a:rPr lang="en-GB" sz="1800" kern="1200" dirty="0" smtClean="0">
-                          <a:solidFill>
-                            <a:schemeClr val="dk1"/>
-                          </a:solidFill>
-                          <a:effectLst/>
-                          <a:latin typeface="+mn-lt"/>
-                          <a:ea typeface="+mn-ea"/>
-                          <a:cs typeface="+mn-cs"/>
-                        </a:rPr>
-                        <a:t>.</a:t>
-                      </a:r>
-                      <a:endParaRPr lang="en-US" sz="1200" kern="1200" dirty="0" smtClean="0">
-                        <a:solidFill>
-                          <a:schemeClr val="dk1"/>
-                        </a:solidFill>
-                        <a:effectLst/>
-                        <a:latin typeface="+mn-lt"/>
-                        <a:ea typeface="+mn-ea"/>
-                        <a:cs typeface="+mn-cs"/>
-                      </a:endParaRPr>
-                    </a:p>
-                    <a:p>
-                      <a:pPr marL="406400" lvl="2" indent="-342900">
-                        <a:buAutoNum type="arabicPeriod"/>
-                      </a:pPr>
-                      <a:r>
-                        <a:rPr lang="en-GB" sz="1800" kern="1200" dirty="0" err="1" smtClean="0">
-                          <a:solidFill>
-                            <a:schemeClr val="dk1"/>
-                          </a:solidFill>
-                          <a:effectLst/>
-                          <a:latin typeface="+mn-lt"/>
-                          <a:ea typeface="+mn-ea"/>
-                          <a:cs typeface="+mn-cs"/>
-                        </a:rPr>
-                        <a:t>Tidak</a:t>
-                      </a:r>
-                      <a:r>
-                        <a:rPr lang="en-GB" sz="1800" kern="1200" dirty="0" smtClean="0">
-                          <a:solidFill>
-                            <a:schemeClr val="dk1"/>
-                          </a:solidFill>
-                          <a:effectLst/>
-                          <a:latin typeface="+mn-lt"/>
-                          <a:ea typeface="+mn-ea"/>
-                          <a:cs typeface="+mn-cs"/>
-                        </a:rPr>
-                        <a:t> </a:t>
-                      </a:r>
-                      <a:r>
-                        <a:rPr lang="en-GB" sz="1800" kern="1200" dirty="0" err="1" smtClean="0">
-                          <a:solidFill>
-                            <a:schemeClr val="dk1"/>
-                          </a:solidFill>
-                          <a:effectLst/>
-                          <a:latin typeface="+mn-lt"/>
-                          <a:ea typeface="+mn-ea"/>
-                          <a:cs typeface="+mn-cs"/>
-                        </a:rPr>
-                        <a:t>ada</a:t>
-                      </a:r>
-                      <a:r>
-                        <a:rPr lang="en-GB" sz="1800" kern="1200" dirty="0" smtClean="0">
-                          <a:solidFill>
-                            <a:schemeClr val="dk1"/>
-                          </a:solidFill>
-                          <a:effectLst/>
-                          <a:latin typeface="+mn-lt"/>
-                          <a:ea typeface="+mn-ea"/>
-                          <a:cs typeface="+mn-cs"/>
-                        </a:rPr>
-                        <a:t> </a:t>
-                      </a:r>
-                      <a:r>
-                        <a:rPr lang="en-GB" sz="1800" kern="1200" dirty="0" err="1" smtClean="0">
-                          <a:solidFill>
-                            <a:schemeClr val="dk1"/>
-                          </a:solidFill>
-                          <a:effectLst/>
-                          <a:latin typeface="+mn-lt"/>
-                          <a:ea typeface="+mn-ea"/>
-                          <a:cs typeface="+mn-cs"/>
-                        </a:rPr>
-                        <a:t>perangkat</a:t>
-                      </a:r>
-                      <a:r>
-                        <a:rPr lang="en-GB" sz="1800" kern="1200" dirty="0" smtClean="0">
-                          <a:solidFill>
-                            <a:schemeClr val="dk1"/>
-                          </a:solidFill>
-                          <a:effectLst/>
-                          <a:latin typeface="+mn-lt"/>
-                          <a:ea typeface="+mn-ea"/>
-                          <a:cs typeface="+mn-cs"/>
-                        </a:rPr>
-                        <a:t> </a:t>
-                      </a:r>
-                      <a:r>
-                        <a:rPr lang="en-GB" sz="1800" kern="1200" dirty="0" err="1" smtClean="0">
-                          <a:solidFill>
-                            <a:schemeClr val="dk1"/>
-                          </a:solidFill>
-                          <a:effectLst/>
-                          <a:latin typeface="+mn-lt"/>
-                          <a:ea typeface="+mn-ea"/>
-                          <a:cs typeface="+mn-cs"/>
-                        </a:rPr>
-                        <a:t>lunak</a:t>
-                      </a:r>
-                      <a:r>
-                        <a:rPr lang="en-GB" sz="1800" kern="1200" dirty="0" smtClean="0">
-                          <a:solidFill>
-                            <a:schemeClr val="dk1"/>
-                          </a:solidFill>
-                          <a:effectLst/>
-                          <a:latin typeface="+mn-lt"/>
-                          <a:ea typeface="+mn-ea"/>
-                          <a:cs typeface="+mn-cs"/>
-                        </a:rPr>
-                        <a:t> lain yang </a:t>
-                      </a:r>
-                      <a:r>
-                        <a:rPr lang="en-GB" sz="1800" kern="1200" dirty="0" err="1" smtClean="0">
-                          <a:solidFill>
-                            <a:schemeClr val="dk1"/>
-                          </a:solidFill>
-                          <a:effectLst/>
-                          <a:latin typeface="+mn-lt"/>
-                          <a:ea typeface="+mn-ea"/>
-                          <a:cs typeface="+mn-cs"/>
-                        </a:rPr>
-                        <a:t>mendukung</a:t>
-                      </a:r>
-                      <a:r>
-                        <a:rPr lang="en-GB" sz="1800" kern="1200" dirty="0" smtClean="0">
-                          <a:solidFill>
-                            <a:schemeClr val="dk1"/>
-                          </a:solidFill>
-                          <a:effectLst/>
-                          <a:latin typeface="+mn-lt"/>
-                          <a:ea typeface="+mn-ea"/>
-                          <a:cs typeface="+mn-cs"/>
-                        </a:rPr>
-                        <a:t> proses </a:t>
-                      </a:r>
-                      <a:r>
-                        <a:rPr lang="en-GB" sz="1800" kern="1200" dirty="0" err="1" smtClean="0">
-                          <a:solidFill>
-                            <a:schemeClr val="dk1"/>
-                          </a:solidFill>
-                          <a:effectLst/>
-                          <a:latin typeface="+mn-lt"/>
-                          <a:ea typeface="+mn-ea"/>
-                          <a:cs typeface="+mn-cs"/>
-                        </a:rPr>
-                        <a:t>pengujian</a:t>
-                      </a:r>
-                      <a:r>
-                        <a:rPr lang="en-GB" sz="1800" kern="1200" dirty="0" smtClean="0">
-                          <a:solidFill>
-                            <a:schemeClr val="dk1"/>
-                          </a:solidFill>
-                          <a:effectLst/>
-                          <a:latin typeface="+mn-lt"/>
-                          <a:ea typeface="+mn-ea"/>
-                          <a:cs typeface="+mn-cs"/>
-                        </a:rPr>
-                        <a:t>.</a:t>
-                      </a:r>
-                      <a:endParaRPr lang="en-US" sz="1200" kern="1200" dirty="0" smtClean="0">
-                        <a:solidFill>
-                          <a:schemeClr val="dk1"/>
-                        </a:solidFill>
-                        <a:effectLst/>
-                        <a:latin typeface="+mn-lt"/>
-                        <a:ea typeface="+mn-ea"/>
-                        <a:cs typeface="+mn-cs"/>
-                      </a:endParaRPr>
-                    </a:p>
-                    <a:p>
-                      <a:pPr marL="406400" lvl="2" indent="-342900">
-                        <a:buAutoNum type="arabicPeriod"/>
-                      </a:pPr>
-                      <a:r>
-                        <a:rPr lang="en-GB" sz="1800" kern="1200" dirty="0" err="1" smtClean="0">
-                          <a:solidFill>
-                            <a:schemeClr val="dk1"/>
-                          </a:solidFill>
-                          <a:effectLst/>
-                          <a:latin typeface="+mn-lt"/>
-                          <a:ea typeface="+mn-ea"/>
-                          <a:cs typeface="+mn-cs"/>
-                        </a:rPr>
-                        <a:t>Tidak</a:t>
-                      </a:r>
-                      <a:r>
-                        <a:rPr lang="en-GB" sz="1800" kern="1200" dirty="0" smtClean="0">
-                          <a:solidFill>
-                            <a:schemeClr val="dk1"/>
-                          </a:solidFill>
-                          <a:effectLst/>
-                          <a:latin typeface="+mn-lt"/>
-                          <a:ea typeface="+mn-ea"/>
-                          <a:cs typeface="+mn-cs"/>
-                        </a:rPr>
-                        <a:t> </a:t>
-                      </a:r>
-                      <a:r>
-                        <a:rPr lang="en-GB" sz="1800" kern="1200" dirty="0" err="1" smtClean="0">
-                          <a:solidFill>
-                            <a:schemeClr val="dk1"/>
-                          </a:solidFill>
-                          <a:effectLst/>
-                          <a:latin typeface="+mn-lt"/>
-                          <a:ea typeface="+mn-ea"/>
-                          <a:cs typeface="+mn-cs"/>
-                        </a:rPr>
-                        <a:t>ditemukan</a:t>
-                      </a:r>
-                      <a:r>
-                        <a:rPr lang="en-GB" sz="1800" kern="1200" dirty="0" smtClean="0">
-                          <a:solidFill>
-                            <a:schemeClr val="dk1"/>
-                          </a:solidFill>
-                          <a:effectLst/>
-                          <a:latin typeface="+mn-lt"/>
-                          <a:ea typeface="+mn-ea"/>
-                          <a:cs typeface="+mn-cs"/>
-                        </a:rPr>
-                        <a:t> </a:t>
-                      </a:r>
-                      <a:r>
-                        <a:rPr lang="en-GB" sz="1800" kern="1200" dirty="0" err="1" smtClean="0">
-                          <a:solidFill>
-                            <a:schemeClr val="dk1"/>
-                          </a:solidFill>
-                          <a:effectLst/>
-                          <a:latin typeface="+mn-lt"/>
-                          <a:ea typeface="+mn-ea"/>
-                          <a:cs typeface="+mn-cs"/>
-                        </a:rPr>
-                        <a:t>perangkat</a:t>
-                      </a:r>
-                      <a:r>
-                        <a:rPr lang="en-GB" sz="1800" kern="1200" dirty="0" smtClean="0">
-                          <a:solidFill>
-                            <a:schemeClr val="dk1"/>
-                          </a:solidFill>
-                          <a:effectLst/>
-                          <a:latin typeface="+mn-lt"/>
-                          <a:ea typeface="+mn-ea"/>
-                          <a:cs typeface="+mn-cs"/>
-                        </a:rPr>
-                        <a:t> </a:t>
-                      </a:r>
-                      <a:r>
-                        <a:rPr lang="en-GB" sz="1800" kern="1200" dirty="0" err="1" smtClean="0">
-                          <a:solidFill>
-                            <a:schemeClr val="dk1"/>
-                          </a:solidFill>
-                          <a:effectLst/>
-                          <a:latin typeface="+mn-lt"/>
-                          <a:ea typeface="+mn-ea"/>
-                          <a:cs typeface="+mn-cs"/>
-                        </a:rPr>
-                        <a:t>lunak</a:t>
-                      </a:r>
-                      <a:r>
-                        <a:rPr lang="en-GB" sz="1800" kern="1200" dirty="0" smtClean="0">
-                          <a:solidFill>
-                            <a:schemeClr val="dk1"/>
-                          </a:solidFill>
-                          <a:effectLst/>
-                          <a:latin typeface="+mn-lt"/>
-                          <a:ea typeface="+mn-ea"/>
-                          <a:cs typeface="+mn-cs"/>
-                        </a:rPr>
-                        <a:t> lain </a:t>
-                      </a:r>
-                      <a:r>
-                        <a:rPr lang="en-GB" sz="1800" kern="1200" dirty="0" err="1" smtClean="0">
-                          <a:solidFill>
-                            <a:schemeClr val="dk1"/>
-                          </a:solidFill>
-                          <a:effectLst/>
-                          <a:latin typeface="+mn-lt"/>
-                          <a:ea typeface="+mn-ea"/>
-                          <a:cs typeface="+mn-cs"/>
-                        </a:rPr>
-                        <a:t>untuk</a:t>
-                      </a:r>
-                      <a:r>
-                        <a:rPr lang="en-GB" sz="1800" kern="1200" dirty="0" smtClean="0">
-                          <a:solidFill>
-                            <a:schemeClr val="dk1"/>
-                          </a:solidFill>
-                          <a:effectLst/>
-                          <a:latin typeface="+mn-lt"/>
-                          <a:ea typeface="+mn-ea"/>
-                          <a:cs typeface="+mn-cs"/>
-                        </a:rPr>
-                        <a:t> </a:t>
-                      </a:r>
-                      <a:r>
-                        <a:rPr lang="en-GB" sz="1800" kern="1200" dirty="0" err="1" smtClean="0">
-                          <a:solidFill>
-                            <a:schemeClr val="dk1"/>
-                          </a:solidFill>
-                          <a:effectLst/>
-                          <a:latin typeface="+mn-lt"/>
-                          <a:ea typeface="+mn-ea"/>
-                          <a:cs typeface="+mn-cs"/>
-                        </a:rPr>
-                        <a:t>mendukung</a:t>
-                      </a:r>
-                      <a:r>
-                        <a:rPr lang="en-GB" sz="1800" kern="1200" dirty="0" smtClean="0">
-                          <a:solidFill>
-                            <a:schemeClr val="dk1"/>
-                          </a:solidFill>
-                          <a:effectLst/>
-                          <a:latin typeface="+mn-lt"/>
-                          <a:ea typeface="+mn-ea"/>
-                          <a:cs typeface="+mn-cs"/>
-                        </a:rPr>
-                        <a:t> </a:t>
-                      </a:r>
-                      <a:r>
-                        <a:rPr lang="en-GB" sz="1800" kern="1200" dirty="0" err="1" smtClean="0">
-                          <a:solidFill>
-                            <a:schemeClr val="dk1"/>
-                          </a:solidFill>
-                          <a:effectLst/>
-                          <a:latin typeface="+mn-lt"/>
-                          <a:ea typeface="+mn-ea"/>
-                          <a:cs typeface="+mn-cs"/>
-                        </a:rPr>
-                        <a:t>analisis</a:t>
-                      </a:r>
-                      <a:r>
-                        <a:rPr lang="en-GB" sz="1800" kern="1200" dirty="0" smtClean="0">
-                          <a:solidFill>
-                            <a:schemeClr val="dk1"/>
-                          </a:solidFill>
-                          <a:effectLst/>
-                          <a:latin typeface="+mn-lt"/>
-                          <a:ea typeface="+mn-ea"/>
-                          <a:cs typeface="+mn-cs"/>
-                        </a:rPr>
-                        <a:t> </a:t>
-                      </a:r>
-                      <a:r>
-                        <a:rPr lang="en-GB" sz="1800" kern="1200" dirty="0" err="1" smtClean="0">
-                          <a:solidFill>
-                            <a:schemeClr val="dk1"/>
-                          </a:solidFill>
-                          <a:effectLst/>
-                          <a:latin typeface="+mn-lt"/>
-                          <a:ea typeface="+mn-ea"/>
-                          <a:cs typeface="+mn-cs"/>
-                        </a:rPr>
-                        <a:t>perangkat</a:t>
-                      </a:r>
-                      <a:r>
-                        <a:rPr lang="en-GB" sz="1800" kern="1200" dirty="0" smtClean="0">
-                          <a:solidFill>
-                            <a:schemeClr val="dk1"/>
-                          </a:solidFill>
-                          <a:effectLst/>
-                          <a:latin typeface="+mn-lt"/>
-                          <a:ea typeface="+mn-ea"/>
-                          <a:cs typeface="+mn-cs"/>
-                        </a:rPr>
-                        <a:t> </a:t>
-                      </a:r>
-                      <a:r>
-                        <a:rPr lang="en-GB" sz="1800" kern="1200" dirty="0" err="1" smtClean="0">
-                          <a:solidFill>
-                            <a:schemeClr val="dk1"/>
-                          </a:solidFill>
-                          <a:effectLst/>
-                          <a:latin typeface="+mn-lt"/>
-                          <a:ea typeface="+mn-ea"/>
-                          <a:cs typeface="+mn-cs"/>
-                        </a:rPr>
-                        <a:t>lunak</a:t>
-                      </a:r>
-                      <a:r>
-                        <a:rPr lang="en-GB" sz="1800" kern="1200" dirty="0" smtClean="0">
-                          <a:solidFill>
-                            <a:schemeClr val="dk1"/>
-                          </a:solidFill>
-                          <a:effectLst/>
-                          <a:latin typeface="+mn-lt"/>
-                          <a:ea typeface="+mn-ea"/>
-                          <a:cs typeface="+mn-cs"/>
-                        </a:rPr>
-                        <a:t> </a:t>
-                      </a:r>
-                      <a:r>
-                        <a:rPr lang="en-GB" sz="1800" kern="1200" dirty="0" err="1" smtClean="0">
-                          <a:solidFill>
-                            <a:schemeClr val="dk1"/>
-                          </a:solidFill>
-                          <a:effectLst/>
-                          <a:latin typeface="+mn-lt"/>
-                          <a:ea typeface="+mn-ea"/>
-                          <a:cs typeface="+mn-cs"/>
-                        </a:rPr>
-                        <a:t>dan</a:t>
-                      </a:r>
-                      <a:r>
-                        <a:rPr lang="en-GB" sz="1800" kern="1200" dirty="0" smtClean="0">
-                          <a:solidFill>
-                            <a:schemeClr val="dk1"/>
-                          </a:solidFill>
-                          <a:effectLst/>
-                          <a:latin typeface="+mn-lt"/>
-                          <a:ea typeface="+mn-ea"/>
-                          <a:cs typeface="+mn-cs"/>
-                        </a:rPr>
-                        <a:t> </a:t>
-                      </a:r>
-                      <a:r>
-                        <a:rPr lang="en-GB" sz="1800" kern="1200" dirty="0" err="1" smtClean="0">
-                          <a:solidFill>
-                            <a:schemeClr val="dk1"/>
-                          </a:solidFill>
-                          <a:effectLst/>
-                          <a:latin typeface="+mn-lt"/>
-                          <a:ea typeface="+mn-ea"/>
-                          <a:cs typeface="+mn-cs"/>
-                        </a:rPr>
-                        <a:t>desain</a:t>
-                      </a:r>
-                      <a:r>
-                        <a:rPr lang="en-GB" sz="1800" kern="1200" dirty="0" smtClean="0">
-                          <a:solidFill>
-                            <a:schemeClr val="dk1"/>
-                          </a:solidFill>
-                          <a:effectLst/>
-                          <a:latin typeface="+mn-lt"/>
-                          <a:ea typeface="+mn-ea"/>
-                          <a:cs typeface="+mn-cs"/>
-                        </a:rPr>
-                        <a:t> proses.</a:t>
-                      </a:r>
-                      <a:endParaRPr lang="en-US" sz="1200" kern="1200" dirty="0">
-                        <a:solidFill>
-                          <a:schemeClr val="dk1"/>
-                        </a:solidFill>
-                        <a:effectLst/>
-                        <a:latin typeface="+mn-lt"/>
-                        <a:ea typeface="+mn-ea"/>
-                        <a:cs typeface="+mn-cs"/>
-                      </a:endParaRPr>
+                      <a:r>
+                        <a:rPr lang="en-US" dirty="0" err="1" smtClean="0"/>
+                        <a:t>Git</a:t>
+                      </a:r>
+                      <a:r>
+                        <a:rPr lang="en-US" dirty="0" smtClean="0"/>
+                        <a:t> Hub</a:t>
+                      </a:r>
+                      <a:endParaRPr lang="en-US" dirty="0"/>
                     </a:p>
                   </a:txBody>
                   <a:tcPr/>
                 </a:tc>
               </a:tr>
-              <a:tr h="986873">
+              <a:tr h="457200">
                 <a:tc>
                   <a:txBody>
                     <a:bodyPr/>
                     <a:lstStyle/>
                     <a:p>
                       <a:r>
-                        <a:rPr lang="en-US" dirty="0" err="1" smtClean="0"/>
-                        <a:t>Risiko</a:t>
-                      </a:r>
-                      <a:r>
-                        <a:rPr lang="en-US" baseline="0" dirty="0" smtClean="0"/>
-                        <a:t> </a:t>
-                      </a:r>
-                      <a:r>
-                        <a:rPr lang="en-US" baseline="0" dirty="0" err="1" smtClean="0"/>
-                        <a:t>Ketersediaan</a:t>
-                      </a:r>
-                      <a:r>
-                        <a:rPr lang="en-US" baseline="0" dirty="0" smtClean="0"/>
-                        <a:t> </a:t>
-                      </a:r>
-                      <a:r>
-                        <a:rPr lang="en-US" baseline="0" dirty="0" err="1" smtClean="0"/>
-                        <a:t>Personalia</a:t>
+                        <a:rPr lang="en-US" dirty="0" smtClean="0"/>
+                        <a:t>UI</a:t>
                       </a:r>
                       <a:endParaRPr lang="en-US" dirty="0"/>
                     </a:p>
@@ -8155,432 +9059,13 @@
                     <a:bodyPr/>
                     <a:lstStyle/>
                     <a:p>
-                      <a:pPr marL="406400" lvl="2" indent="-342900">
-                        <a:buAutoNum type="arabicPeriod"/>
-                      </a:pPr>
-                      <a:r>
-                        <a:rPr lang="en-GB" sz="1800" kern="1200" dirty="0" err="1" smtClean="0">
-                          <a:solidFill>
-                            <a:schemeClr val="dk1"/>
-                          </a:solidFill>
-                          <a:effectLst/>
-                          <a:latin typeface="+mn-lt"/>
-                          <a:ea typeface="+mn-ea"/>
-                          <a:cs typeface="+mn-cs"/>
-                        </a:rPr>
-                        <a:t>Kurang</a:t>
-                      </a:r>
-                      <a:r>
-                        <a:rPr lang="en-GB" sz="1800" kern="1200" dirty="0" smtClean="0">
-                          <a:solidFill>
-                            <a:schemeClr val="dk1"/>
-                          </a:solidFill>
-                          <a:effectLst/>
-                          <a:latin typeface="+mn-lt"/>
-                          <a:ea typeface="+mn-ea"/>
-                          <a:cs typeface="+mn-cs"/>
-                        </a:rPr>
+                      <a:r>
+                        <a:rPr lang="en-US" dirty="0" smtClean="0"/>
+                        <a:t>Adobe Photoshop</a:t>
+                      </a:r>
+                      <a:r>
+                        <a:rPr lang="en-US" baseline="0" dirty="0" smtClean="0"/>
                         <a:t> </a:t>
-                      </a:r>
-                      <a:r>
-                        <a:rPr lang="en-GB" sz="1800" kern="1200" dirty="0" err="1" smtClean="0">
-                          <a:solidFill>
-                            <a:schemeClr val="dk1"/>
-                          </a:solidFill>
-                          <a:effectLst/>
-                          <a:latin typeface="+mn-lt"/>
-                          <a:ea typeface="+mn-ea"/>
-                          <a:cs typeface="+mn-cs"/>
-                        </a:rPr>
-                        <a:t>berkomitmennya</a:t>
-                      </a:r>
-                      <a:r>
-                        <a:rPr lang="en-GB" sz="1800" kern="1200" dirty="0" smtClean="0">
-                          <a:solidFill>
-                            <a:schemeClr val="dk1"/>
-                          </a:solidFill>
-                          <a:effectLst/>
-                          <a:latin typeface="+mn-lt"/>
-                          <a:ea typeface="+mn-ea"/>
-                          <a:cs typeface="+mn-cs"/>
-                        </a:rPr>
-                        <a:t> </a:t>
-                      </a:r>
-                      <a:r>
-                        <a:rPr lang="en-GB" sz="1800" kern="1200" dirty="0" err="1" smtClean="0">
-                          <a:solidFill>
-                            <a:schemeClr val="dk1"/>
-                          </a:solidFill>
-                          <a:effectLst/>
-                          <a:latin typeface="+mn-lt"/>
-                          <a:ea typeface="+mn-ea"/>
-                          <a:cs typeface="+mn-cs"/>
-                        </a:rPr>
-                        <a:t>staf</a:t>
-                      </a:r>
-                      <a:r>
-                        <a:rPr lang="en-GB" sz="1800" kern="1200" dirty="0" smtClean="0">
-                          <a:solidFill>
-                            <a:schemeClr val="dk1"/>
-                          </a:solidFill>
-                          <a:effectLst/>
-                          <a:latin typeface="+mn-lt"/>
-                          <a:ea typeface="+mn-ea"/>
-                          <a:cs typeface="+mn-cs"/>
-                        </a:rPr>
-                        <a:t> </a:t>
-                      </a:r>
-                      <a:r>
-                        <a:rPr lang="en-GB" sz="1800" kern="1200" dirty="0" err="1" smtClean="0">
-                          <a:solidFill>
-                            <a:schemeClr val="dk1"/>
-                          </a:solidFill>
-                          <a:effectLst/>
-                          <a:latin typeface="+mn-lt"/>
-                          <a:ea typeface="+mn-ea"/>
-                          <a:cs typeface="+mn-cs"/>
-                        </a:rPr>
-                        <a:t>dalam</a:t>
-                      </a:r>
-                      <a:r>
-                        <a:rPr lang="en-GB" sz="1800" kern="1200" dirty="0" smtClean="0">
-                          <a:solidFill>
-                            <a:schemeClr val="dk1"/>
-                          </a:solidFill>
-                          <a:effectLst/>
-                          <a:latin typeface="+mn-lt"/>
-                          <a:ea typeface="+mn-ea"/>
-                          <a:cs typeface="+mn-cs"/>
-                        </a:rPr>
-                        <a:t> </a:t>
-                      </a:r>
-                      <a:r>
-                        <a:rPr lang="en-GB" sz="1800" kern="1200" dirty="0" err="1" smtClean="0">
-                          <a:solidFill>
-                            <a:schemeClr val="dk1"/>
-                          </a:solidFill>
-                          <a:effectLst/>
-                          <a:latin typeface="+mn-lt"/>
-                          <a:ea typeface="+mn-ea"/>
-                          <a:cs typeface="+mn-cs"/>
-                        </a:rPr>
-                        <a:t>pengerjaan</a:t>
-                      </a:r>
-                      <a:r>
-                        <a:rPr lang="en-GB" sz="1800" kern="1200" dirty="0" smtClean="0">
-                          <a:solidFill>
-                            <a:schemeClr val="dk1"/>
-                          </a:solidFill>
-                          <a:effectLst/>
-                          <a:latin typeface="+mn-lt"/>
-                          <a:ea typeface="+mn-ea"/>
-                          <a:cs typeface="+mn-cs"/>
-                        </a:rPr>
-                        <a:t> </a:t>
-                      </a:r>
-                      <a:r>
-                        <a:rPr lang="en-GB" sz="1800" kern="1200" dirty="0" err="1" smtClean="0">
-                          <a:solidFill>
-                            <a:schemeClr val="dk1"/>
-                          </a:solidFill>
-                          <a:effectLst/>
-                          <a:latin typeface="+mn-lt"/>
-                          <a:ea typeface="+mn-ea"/>
-                          <a:cs typeface="+mn-cs"/>
-                        </a:rPr>
-                        <a:t>proyek</a:t>
-                      </a:r>
-                      <a:r>
-                        <a:rPr lang="en-GB" sz="1800" kern="1200" dirty="0" smtClean="0">
-                          <a:solidFill>
-                            <a:schemeClr val="dk1"/>
-                          </a:solidFill>
-                          <a:effectLst/>
-                          <a:latin typeface="+mn-lt"/>
-                          <a:ea typeface="+mn-ea"/>
-                          <a:cs typeface="+mn-cs"/>
-                        </a:rPr>
-                        <a:t>.</a:t>
-                      </a:r>
-                      <a:endParaRPr lang="en-US" sz="1200" kern="1200" dirty="0" smtClean="0">
-                        <a:solidFill>
-                          <a:schemeClr val="dk1"/>
-                        </a:solidFill>
-                        <a:effectLst/>
-                        <a:latin typeface="+mn-lt"/>
-                        <a:ea typeface="+mn-ea"/>
-                        <a:cs typeface="+mn-cs"/>
-                      </a:endParaRPr>
-                    </a:p>
-                    <a:p>
-                      <a:pPr marL="406400" lvl="2" indent="-342900">
-                        <a:buAutoNum type="arabicPeriod"/>
-                      </a:pPr>
-                      <a:r>
-                        <a:rPr lang="en-GB" sz="1800" kern="1200" dirty="0" err="1" smtClean="0">
-                          <a:solidFill>
-                            <a:schemeClr val="dk1"/>
-                          </a:solidFill>
-                          <a:effectLst/>
-                          <a:latin typeface="+mn-lt"/>
-                          <a:ea typeface="+mn-ea"/>
-                          <a:cs typeface="+mn-cs"/>
-                        </a:rPr>
-                        <a:t>Kurangnya</a:t>
-                      </a:r>
-                      <a:r>
-                        <a:rPr lang="en-GB" sz="1800" kern="1200" dirty="0" smtClean="0">
-                          <a:solidFill>
-                            <a:schemeClr val="dk1"/>
-                          </a:solidFill>
-                          <a:effectLst/>
-                          <a:latin typeface="+mn-lt"/>
-                          <a:ea typeface="+mn-ea"/>
-                          <a:cs typeface="+mn-cs"/>
-                        </a:rPr>
-                        <a:t> </a:t>
-                      </a:r>
-                      <a:r>
-                        <a:rPr lang="en-GB" sz="1800" kern="1200" dirty="0" err="1" smtClean="0">
-                          <a:solidFill>
-                            <a:schemeClr val="dk1"/>
-                          </a:solidFill>
-                          <a:effectLst/>
-                          <a:latin typeface="+mn-lt"/>
-                          <a:ea typeface="+mn-ea"/>
-                          <a:cs typeface="+mn-cs"/>
-                        </a:rPr>
-                        <a:t>jumlah</a:t>
-                      </a:r>
-                      <a:r>
-                        <a:rPr lang="en-GB" sz="1800" kern="1200" dirty="0" smtClean="0">
-                          <a:solidFill>
-                            <a:schemeClr val="dk1"/>
-                          </a:solidFill>
-                          <a:effectLst/>
-                          <a:latin typeface="+mn-lt"/>
-                          <a:ea typeface="+mn-ea"/>
-                          <a:cs typeface="+mn-cs"/>
-                        </a:rPr>
-                        <a:t> </a:t>
-                      </a:r>
-                      <a:r>
-                        <a:rPr lang="en-GB" sz="1800" kern="1200" dirty="0" err="1" smtClean="0">
-                          <a:solidFill>
-                            <a:schemeClr val="dk1"/>
-                          </a:solidFill>
-                          <a:effectLst/>
-                          <a:latin typeface="+mn-lt"/>
-                          <a:ea typeface="+mn-ea"/>
-                          <a:cs typeface="+mn-cs"/>
-                        </a:rPr>
-                        <a:t>staf</a:t>
-                      </a:r>
-                      <a:r>
-                        <a:rPr lang="en-GB" sz="1800" kern="1200" dirty="0" smtClean="0">
-                          <a:solidFill>
-                            <a:schemeClr val="dk1"/>
-                          </a:solidFill>
-                          <a:effectLst/>
-                          <a:latin typeface="+mn-lt"/>
-                          <a:ea typeface="+mn-ea"/>
-                          <a:cs typeface="+mn-cs"/>
-                        </a:rPr>
-                        <a:t> </a:t>
-                      </a:r>
-                      <a:r>
-                        <a:rPr lang="en-GB" sz="1800" kern="1200" dirty="0" err="1" smtClean="0">
-                          <a:solidFill>
-                            <a:schemeClr val="dk1"/>
-                          </a:solidFill>
-                          <a:effectLst/>
-                          <a:latin typeface="+mn-lt"/>
-                          <a:ea typeface="+mn-ea"/>
-                          <a:cs typeface="+mn-cs"/>
-                        </a:rPr>
-                        <a:t>karena</a:t>
-                      </a:r>
-                      <a:r>
-                        <a:rPr lang="en-GB" sz="1800" kern="1200" dirty="0" smtClean="0">
-                          <a:solidFill>
-                            <a:schemeClr val="dk1"/>
-                          </a:solidFill>
-                          <a:effectLst/>
-                          <a:latin typeface="+mn-lt"/>
-                          <a:ea typeface="+mn-ea"/>
-                          <a:cs typeface="+mn-cs"/>
-                        </a:rPr>
-                        <a:t> </a:t>
-                      </a:r>
-                      <a:r>
-                        <a:rPr lang="en-GB" sz="1800" kern="1200" dirty="0" err="1" smtClean="0">
-                          <a:solidFill>
-                            <a:schemeClr val="dk1"/>
-                          </a:solidFill>
-                          <a:effectLst/>
-                          <a:latin typeface="+mn-lt"/>
-                          <a:ea typeface="+mn-ea"/>
-                          <a:cs typeface="+mn-cs"/>
-                        </a:rPr>
-                        <a:t>kompleksitas</a:t>
-                      </a:r>
-                      <a:r>
-                        <a:rPr lang="en-GB" sz="1800" kern="1200" dirty="0" smtClean="0">
-                          <a:solidFill>
-                            <a:schemeClr val="dk1"/>
-                          </a:solidFill>
-                          <a:effectLst/>
-                          <a:latin typeface="+mn-lt"/>
-                          <a:ea typeface="+mn-ea"/>
-                          <a:cs typeface="+mn-cs"/>
-                        </a:rPr>
-                        <a:t> </a:t>
-                      </a:r>
-                      <a:r>
-                        <a:rPr lang="en-GB" sz="1800" kern="1200" dirty="0" err="1" smtClean="0">
-                          <a:solidFill>
-                            <a:schemeClr val="dk1"/>
-                          </a:solidFill>
-                          <a:effectLst/>
-                          <a:latin typeface="+mn-lt"/>
-                          <a:ea typeface="+mn-ea"/>
-                          <a:cs typeface="+mn-cs"/>
-                        </a:rPr>
-                        <a:t>produk</a:t>
-                      </a:r>
-                      <a:r>
-                        <a:rPr lang="en-GB" sz="1800" kern="1200" dirty="0" smtClean="0">
-                          <a:solidFill>
-                            <a:schemeClr val="dk1"/>
-                          </a:solidFill>
-                          <a:effectLst/>
-                          <a:latin typeface="+mn-lt"/>
-                          <a:ea typeface="+mn-ea"/>
-                          <a:cs typeface="+mn-cs"/>
-                        </a:rPr>
-                        <a:t>.</a:t>
-                      </a:r>
-                      <a:endParaRPr lang="en-US" sz="1200" kern="1200" dirty="0" smtClean="0">
-                        <a:solidFill>
-                          <a:schemeClr val="dk1"/>
-                        </a:solidFill>
-                        <a:effectLst/>
-                        <a:latin typeface="+mn-lt"/>
-                        <a:ea typeface="+mn-ea"/>
-                        <a:cs typeface="+mn-cs"/>
-                      </a:endParaRPr>
-                    </a:p>
-                    <a:p>
-                      <a:pPr marL="406400" lvl="2" indent="-342900">
-                        <a:buAutoNum type="arabicPeriod"/>
-                      </a:pPr>
-                      <a:r>
-                        <a:rPr lang="en-GB" sz="1800" kern="1200" dirty="0" smtClean="0">
-                          <a:solidFill>
-                            <a:schemeClr val="dk1"/>
-                          </a:solidFill>
-                          <a:effectLst/>
-                          <a:latin typeface="+mn-lt"/>
-                          <a:ea typeface="+mn-ea"/>
-                          <a:cs typeface="+mn-cs"/>
-                        </a:rPr>
-                        <a:t>Tingkat </a:t>
-                      </a:r>
-                      <a:r>
-                        <a:rPr lang="en-GB" sz="1800" i="1" kern="1200" dirty="0" smtClean="0">
-                          <a:solidFill>
-                            <a:schemeClr val="dk1"/>
-                          </a:solidFill>
-                          <a:effectLst/>
-                          <a:latin typeface="+mn-lt"/>
-                          <a:ea typeface="+mn-ea"/>
-                          <a:cs typeface="+mn-cs"/>
-                        </a:rPr>
-                        <a:t>turnover</a:t>
-                      </a:r>
-                      <a:r>
-                        <a:rPr lang="en-GB" sz="1800" kern="1200" dirty="0" smtClean="0">
-                          <a:solidFill>
-                            <a:schemeClr val="dk1"/>
-                          </a:solidFill>
-                          <a:effectLst/>
-                          <a:latin typeface="+mn-lt"/>
-                          <a:ea typeface="+mn-ea"/>
-                          <a:cs typeface="+mn-cs"/>
-                        </a:rPr>
-                        <a:t> (</a:t>
-                      </a:r>
-                      <a:r>
-                        <a:rPr lang="en-GB" sz="1800" kern="1200" dirty="0" err="1" smtClean="0">
-                          <a:solidFill>
-                            <a:schemeClr val="dk1"/>
-                          </a:solidFill>
-                          <a:effectLst/>
-                          <a:latin typeface="+mn-lt"/>
-                          <a:ea typeface="+mn-ea"/>
-                          <a:cs typeface="+mn-cs"/>
-                        </a:rPr>
-                        <a:t>pergantian</a:t>
-                      </a:r>
-                      <a:r>
-                        <a:rPr lang="en-GB" sz="1800" kern="1200" dirty="0" smtClean="0">
-                          <a:solidFill>
-                            <a:schemeClr val="dk1"/>
-                          </a:solidFill>
-                          <a:effectLst/>
-                          <a:latin typeface="+mn-lt"/>
-                          <a:ea typeface="+mn-ea"/>
-                          <a:cs typeface="+mn-cs"/>
-                        </a:rPr>
-                        <a:t>) </a:t>
-                      </a:r>
-                      <a:r>
-                        <a:rPr lang="en-GB" sz="1800" kern="1200" dirty="0" err="1" smtClean="0">
-                          <a:solidFill>
-                            <a:schemeClr val="dk1"/>
-                          </a:solidFill>
-                          <a:effectLst/>
-                          <a:latin typeface="+mn-lt"/>
-                          <a:ea typeface="+mn-ea"/>
-                          <a:cs typeface="+mn-cs"/>
-                        </a:rPr>
-                        <a:t>staf</a:t>
-                      </a:r>
-                      <a:r>
-                        <a:rPr lang="en-GB" sz="1800" kern="1200" dirty="0" smtClean="0">
-                          <a:solidFill>
-                            <a:schemeClr val="dk1"/>
-                          </a:solidFill>
-                          <a:effectLst/>
-                          <a:latin typeface="+mn-lt"/>
-                          <a:ea typeface="+mn-ea"/>
-                          <a:cs typeface="+mn-cs"/>
-                        </a:rPr>
-                        <a:t> yang </a:t>
-                      </a:r>
-                      <a:r>
-                        <a:rPr lang="en-GB" sz="1800" kern="1200" dirty="0" err="1" smtClean="0">
-                          <a:solidFill>
-                            <a:schemeClr val="dk1"/>
-                          </a:solidFill>
-                          <a:effectLst/>
-                          <a:latin typeface="+mn-lt"/>
-                          <a:ea typeface="+mn-ea"/>
-                          <a:cs typeface="+mn-cs"/>
-                        </a:rPr>
-                        <a:t>tinggi</a:t>
-                      </a:r>
-                      <a:r>
-                        <a:rPr lang="en-GB" sz="1800" kern="1200" dirty="0" smtClean="0">
-                          <a:solidFill>
-                            <a:schemeClr val="dk1"/>
-                          </a:solidFill>
-                          <a:effectLst/>
-                          <a:latin typeface="+mn-lt"/>
-                          <a:ea typeface="+mn-ea"/>
-                          <a:cs typeface="+mn-cs"/>
-                        </a:rPr>
-                        <a:t>.</a:t>
                       </a:r>
                       <a:endParaRPr lang="en-US" dirty="0"/>
                     </a:p>
@@ -8588,49 +9073,17 @@
                   <a:tcPr/>
                 </a:tc>
               </a:tr>
-              <a:tr h="1316545">
+              <a:tr h="457200">
                 <a:tc>
                   <a:txBody>
                     <a:bodyPr/>
                     <a:lstStyle/>
                     <a:p>
                       <a:r>
-                        <a:rPr lang="en-US" dirty="0" err="1" smtClean="0"/>
-                        <a:t>Risiko</a:t>
-                      </a:r>
-                      <a:r>
                         <a:rPr lang="en-US" dirty="0" smtClean="0"/>
-                        <a:t> </a:t>
-                      </a:r>
-                      <a:r>
-                        <a:rPr lang="en-US" dirty="0" err="1" smtClean="0"/>
-                        <a:t>Penerimaan</a:t>
-                      </a:r>
-                      <a:r>
-                        <a:rPr lang="en-US" dirty="0" smtClean="0"/>
-                        <a:t> </a:t>
-                      </a:r>
-                      <a:r>
-                        <a:rPr lang="en-US" dirty="0" err="1" smtClean="0"/>
-                        <a:t>Pelanggan</a:t>
-                      </a:r>
-                      <a:r>
-                        <a:rPr lang="en-US" dirty="0" smtClean="0"/>
-                        <a:t> </a:t>
-                      </a:r>
-                      <a:r>
-                        <a:rPr lang="en-US" dirty="0" err="1" smtClean="0"/>
-                        <a:t>atas</a:t>
-                      </a:r>
-                      <a:r>
-                        <a:rPr lang="en-US" dirty="0" smtClean="0"/>
-                        <a:t> </a:t>
-                      </a:r>
-                      <a:r>
-                        <a:rPr lang="en-US" dirty="0" err="1" smtClean="0"/>
-                        <a:t>Produk</a:t>
-                      </a:r>
-                      <a:endParaRPr lang="en-US" dirty="0" smtClean="0"/>
+                        <a:t>DB Designer</a:t>
+                      </a:r>
+                      <a:endParaRPr lang="en-US" dirty="0"/>
                     </a:p>
                   </a:txBody>
                   <a:tcPr/>
@@ -8640,333 +9093,85 @@
                     <a:bodyPr/>
                     <a:lstStyle/>
                     <a:p>
-                      <a:pPr marL="406400" lvl="2" indent="-342900">
-                        <a:buAutoNum type="arabicPeriod"/>
-                        <a:tabLst/>
-                      </a:pPr>
-                      <a:r>
-                        <a:rPr lang="id-ID" sz="1800" kern="1200" dirty="0" smtClean="0">
-                          <a:solidFill>
-                            <a:schemeClr val="dk1"/>
-                          </a:solidFill>
-                          <a:effectLst/>
-                          <a:latin typeface="+mn-lt"/>
-                          <a:ea typeface="+mn-ea"/>
-                          <a:cs typeface="+mn-cs"/>
-                        </a:rPr>
-                        <a:t>Pelanggan menolak s</a:t>
-                      </a:r>
-                      <a:r>
-                        <a:rPr lang="en-US" sz="1800" kern="1200" dirty="0" err="1" smtClean="0">
-                          <a:solidFill>
-                            <a:schemeClr val="dk1"/>
-                          </a:solidFill>
-                          <a:effectLst/>
-                          <a:latin typeface="+mn-lt"/>
-                          <a:ea typeface="+mn-ea"/>
-                          <a:cs typeface="+mn-cs"/>
-                        </a:rPr>
-                        <a:t>i</a:t>
-                      </a:r>
-                      <a:r>
-                        <a:rPr lang="id-ID" sz="1800" kern="1200" dirty="0" smtClean="0">
-                          <a:solidFill>
-                            <a:schemeClr val="dk1"/>
-                          </a:solidFill>
-                          <a:effectLst/>
-                          <a:latin typeface="+mn-lt"/>
-                          <a:ea typeface="+mn-ea"/>
-                          <a:cs typeface="+mn-cs"/>
-                        </a:rPr>
-                        <a:t>stem</a:t>
-                      </a:r>
-                      <a:r>
-                        <a:rPr lang="en-US" sz="1800" kern="1200" dirty="0" smtClean="0">
-                          <a:solidFill>
-                            <a:schemeClr val="dk1"/>
-                          </a:solidFill>
-                          <a:effectLst/>
-                          <a:latin typeface="+mn-lt"/>
-                          <a:ea typeface="+mn-ea"/>
-                          <a:cs typeface="+mn-cs"/>
-                        </a:rPr>
-                        <a:t>.</a:t>
-                      </a:r>
+                      <a:r>
+                        <a:rPr lang="en-US" dirty="0" smtClean="0"/>
+                        <a:t>Power Designer</a:t>
+                      </a:r>
+                      <a:endParaRPr lang="en-US" dirty="0"/>
                     </a:p>
+                  </a:txBody>
+                  <a:tcPr/>
+                </a:tc>
+              </a:tr>
+              <a:tr h="457200">
+                <a:tc>
+                  <a:txBody>
+                    <a:bodyPr/>
+                    <a:lstStyle/>
                     <a:p>
-                      <a:pPr marL="406400" lvl="2" indent="-342900">
-                        <a:buAutoNum type="arabicPeriod"/>
-                        <a:tabLst/>
-                      </a:pPr>
-                      <a:r>
-                        <a:rPr lang="en-US" sz="1800" kern="1200" dirty="0" err="1" smtClean="0">
-                          <a:solidFill>
-                            <a:schemeClr val="dk1"/>
-                          </a:solidFill>
-                          <a:effectLst/>
-                          <a:latin typeface="+mn-lt"/>
-                          <a:ea typeface="+mn-ea"/>
-                          <a:cs typeface="+mn-cs"/>
-                        </a:rPr>
-                        <a:t>Pelanggan</a:t>
-                      </a:r>
-                      <a:r>
-                        <a:rPr lang="en-US" sz="1800" kern="1200" dirty="0" smtClean="0">
-                          <a:solidFill>
-                            <a:schemeClr val="dk1"/>
-                          </a:solidFill>
-                          <a:effectLst/>
-                          <a:latin typeface="+mn-lt"/>
-                          <a:ea typeface="+mn-ea"/>
-                          <a:cs typeface="+mn-cs"/>
-                        </a:rPr>
-                        <a:t> </a:t>
-                      </a:r>
-                      <a:r>
-                        <a:rPr lang="en-US" sz="1800" kern="1200" dirty="0" err="1" smtClean="0">
-                          <a:solidFill>
-                            <a:schemeClr val="dk1"/>
-                          </a:solidFill>
-                          <a:effectLst/>
-                          <a:latin typeface="+mn-lt"/>
-                          <a:ea typeface="+mn-ea"/>
-                          <a:cs typeface="+mn-cs"/>
-                        </a:rPr>
-                        <a:t>ingin</a:t>
-                      </a:r>
-                      <a:r>
-                        <a:rPr lang="en-US" sz="1800" kern="1200" dirty="0" smtClean="0">
-                          <a:solidFill>
-                            <a:schemeClr val="dk1"/>
-                          </a:solidFill>
-                          <a:effectLst/>
-                          <a:latin typeface="+mn-lt"/>
-                          <a:ea typeface="+mn-ea"/>
-                          <a:cs typeface="+mn-cs"/>
-                        </a:rPr>
-                        <a:t> </a:t>
-                      </a:r>
-                      <a:r>
-                        <a:rPr lang="en-US" sz="1800" kern="1200" dirty="0" err="1" smtClean="0">
-                          <a:solidFill>
-                            <a:schemeClr val="dk1"/>
-                          </a:solidFill>
-                          <a:effectLst/>
-                          <a:latin typeface="+mn-lt"/>
-                          <a:ea typeface="+mn-ea"/>
-                          <a:cs typeface="+mn-cs"/>
-                        </a:rPr>
-                        <a:t>menambahkan</a:t>
-                      </a:r>
-                      <a:r>
-                        <a:rPr lang="en-US" sz="1800" kern="1200" dirty="0" smtClean="0">
-                          <a:solidFill>
-                            <a:schemeClr val="dk1"/>
-                          </a:solidFill>
-                          <a:effectLst/>
-                          <a:latin typeface="+mn-lt"/>
-                          <a:ea typeface="+mn-ea"/>
-                          <a:cs typeface="+mn-cs"/>
-                        </a:rPr>
-                        <a:t> </a:t>
-                      </a:r>
-                      <a:r>
-                        <a:rPr lang="en-US" sz="1800" kern="1200" dirty="0" err="1" smtClean="0">
-                          <a:solidFill>
-                            <a:schemeClr val="dk1"/>
-                          </a:solidFill>
-                          <a:effectLst/>
-                          <a:latin typeface="+mn-lt"/>
-                          <a:ea typeface="+mn-ea"/>
-                          <a:cs typeface="+mn-cs"/>
-                        </a:rPr>
-                        <a:t>fitur</a:t>
-                      </a:r>
-                      <a:r>
-                        <a:rPr lang="en-US" sz="1800" kern="1200" dirty="0" smtClean="0">
-                          <a:solidFill>
-                            <a:schemeClr val="dk1"/>
-                          </a:solidFill>
-                          <a:effectLst/>
-                          <a:latin typeface="+mn-lt"/>
-                          <a:ea typeface="+mn-ea"/>
-                          <a:cs typeface="+mn-cs"/>
-                        </a:rPr>
-                        <a:t> </a:t>
-                      </a:r>
-                      <a:r>
-                        <a:rPr lang="en-US" sz="1800" kern="1200" dirty="0" err="1" smtClean="0">
-                          <a:solidFill>
-                            <a:schemeClr val="dk1"/>
-                          </a:solidFill>
-                          <a:effectLst/>
-                          <a:latin typeface="+mn-lt"/>
-                          <a:ea typeface="+mn-ea"/>
-                          <a:cs typeface="+mn-cs"/>
-                        </a:rPr>
-                        <a:t>baru</a:t>
-                      </a:r>
-                      <a:r>
-                        <a:rPr lang="en-US" sz="1800" kern="1200" dirty="0" smtClean="0">
-                          <a:solidFill>
-                            <a:schemeClr val="dk1"/>
-                          </a:solidFill>
-                          <a:effectLst/>
-                          <a:latin typeface="+mn-lt"/>
-                          <a:ea typeface="+mn-ea"/>
-                          <a:cs typeface="+mn-cs"/>
-                        </a:rPr>
-                        <a:t> </a:t>
-                      </a:r>
-                      <a:r>
-                        <a:rPr lang="en-US" sz="1800" kern="1200" dirty="0" err="1" smtClean="0">
-                          <a:solidFill>
-                            <a:schemeClr val="dk1"/>
-                          </a:solidFill>
-                          <a:effectLst/>
-                          <a:latin typeface="+mn-lt"/>
-                          <a:ea typeface="+mn-ea"/>
-                          <a:cs typeface="+mn-cs"/>
-                        </a:rPr>
-                        <a:t>setelah</a:t>
-                      </a:r>
-                      <a:r>
-                        <a:rPr lang="en-US" sz="1800" kern="1200" dirty="0" smtClean="0">
-                          <a:solidFill>
-                            <a:schemeClr val="dk1"/>
-                          </a:solidFill>
-                          <a:effectLst/>
-                          <a:latin typeface="+mn-lt"/>
-                          <a:ea typeface="+mn-ea"/>
-                          <a:cs typeface="+mn-cs"/>
-                        </a:rPr>
-                        <a:t> </a:t>
-                      </a:r>
-                      <a:r>
-                        <a:rPr lang="en-US" sz="1800" kern="1200" dirty="0" err="1" smtClean="0">
-                          <a:solidFill>
-                            <a:schemeClr val="dk1"/>
-                          </a:solidFill>
-                          <a:effectLst/>
-                          <a:latin typeface="+mn-lt"/>
-                          <a:ea typeface="+mn-ea"/>
-                          <a:cs typeface="+mn-cs"/>
-                        </a:rPr>
-                        <a:t>sistem</a:t>
-                      </a:r>
-                      <a:r>
-                        <a:rPr lang="en-US" sz="1800" kern="1200" dirty="0" smtClean="0">
-                          <a:solidFill>
-                            <a:schemeClr val="dk1"/>
-                          </a:solidFill>
-                          <a:effectLst/>
-                          <a:latin typeface="+mn-lt"/>
-                          <a:ea typeface="+mn-ea"/>
-                          <a:cs typeface="+mn-cs"/>
-                        </a:rPr>
-                        <a:t> </a:t>
-                      </a:r>
-                      <a:r>
-                        <a:rPr lang="en-US" sz="1800" kern="1200" dirty="0" err="1" smtClean="0">
-                          <a:solidFill>
-                            <a:schemeClr val="dk1"/>
-                          </a:solidFill>
-                          <a:effectLst/>
-                          <a:latin typeface="+mn-lt"/>
-                          <a:ea typeface="+mn-ea"/>
-                          <a:cs typeface="+mn-cs"/>
-                        </a:rPr>
-                        <a:t>selesai</a:t>
-                      </a:r>
-                      <a:r>
-                        <a:rPr lang="en-US" sz="1800" kern="1200" dirty="0" smtClean="0">
-                          <a:solidFill>
-                            <a:schemeClr val="dk1"/>
-                          </a:solidFill>
-                          <a:effectLst/>
-                          <a:latin typeface="+mn-lt"/>
-                          <a:ea typeface="+mn-ea"/>
-                          <a:cs typeface="+mn-cs"/>
-                        </a:rPr>
-                        <a:t> </a:t>
-                      </a:r>
-                      <a:r>
-                        <a:rPr lang="en-US" sz="1800" kern="1200" dirty="0" err="1" smtClean="0">
-                          <a:solidFill>
-                            <a:schemeClr val="dk1"/>
-                          </a:solidFill>
-                          <a:effectLst/>
-                          <a:latin typeface="+mn-lt"/>
-                          <a:ea typeface="+mn-ea"/>
-                          <a:cs typeface="+mn-cs"/>
-                        </a:rPr>
-                        <a:t>dibuat</a:t>
-                      </a:r>
-                      <a:r>
-                        <a:rPr lang="en-US" sz="1800" kern="1200" dirty="0" smtClean="0">
-                          <a:solidFill>
-                            <a:schemeClr val="dk1"/>
-                          </a:solidFill>
-                          <a:effectLst/>
-                          <a:latin typeface="+mn-lt"/>
-                          <a:ea typeface="+mn-ea"/>
-                          <a:cs typeface="+mn-cs"/>
-                        </a:rPr>
-                        <a:t>.</a:t>
-                      </a:r>
-                      <a:endParaRPr lang="en-US" sz="1200" kern="1200" dirty="0" smtClean="0">
-                        <a:solidFill>
-                          <a:schemeClr val="dk1"/>
-                        </a:solidFill>
-                        <a:effectLst/>
-                        <a:latin typeface="+mn-lt"/>
-                        <a:ea typeface="+mn-ea"/>
-                        <a:cs typeface="+mn-cs"/>
-                      </a:endParaRPr>
+                      <a:r>
+                        <a:rPr lang="en-US" dirty="0" smtClean="0"/>
+                        <a:t>DBMS</a:t>
+                      </a:r>
+                      <a:endParaRPr lang="en-US" dirty="0"/>
                     </a:p>
+                  </a:txBody>
+                  <a:tcPr/>
+                </a:tc>
+                <a:tc>
+                  <a:txBody>
+                    <a:bodyPr/>
+                    <a:lstStyle/>
                     <a:p>
-                      <a:pPr marL="406400" lvl="2" indent="-342900">
-                        <a:buAutoNum type="arabicPeriod"/>
-                        <a:tabLst/>
-                      </a:pPr>
-                      <a:r>
-                        <a:rPr lang="id-ID" sz="1800" kern="1200" dirty="0" smtClean="0">
-                          <a:solidFill>
-                            <a:schemeClr val="dk1"/>
-                          </a:solidFill>
-                          <a:effectLst/>
-                          <a:latin typeface="+mn-lt"/>
-                          <a:ea typeface="+mn-ea"/>
-                          <a:cs typeface="+mn-cs"/>
-                        </a:rPr>
-                        <a:t>Pelanggan kurang memahami proses perangkat lunak tersebut.</a:t>
-                      </a:r>
-                      <a:endParaRPr lang="en-US" sz="1200" kern="1200" dirty="0" smtClean="0">
-                        <a:solidFill>
-                          <a:schemeClr val="dk1"/>
-                        </a:solidFill>
-                        <a:effectLst/>
-                        <a:latin typeface="+mn-lt"/>
-                        <a:ea typeface="+mn-ea"/>
-                        <a:cs typeface="+mn-cs"/>
-                      </a:endParaRPr>
+                      <a:r>
+                        <a:rPr lang="en-US" dirty="0" smtClean="0"/>
+                        <a:t>MySQL</a:t>
+                      </a:r>
+                      <a:endParaRPr lang="en-US" dirty="0"/>
                     </a:p>
+                  </a:txBody>
+                  <a:tcPr/>
+                </a:tc>
+              </a:tr>
+              <a:tr h="457200">
+                <a:tc>
+                  <a:txBody>
+                    <a:bodyPr/>
+                    <a:lstStyle/>
                     <a:p>
-                      <a:pPr marL="406400" lvl="2" indent="-342900">
-                        <a:buAutoNum type="arabicPeriod"/>
-                        <a:tabLst/>
-                      </a:pPr>
-                      <a:r>
-                        <a:rPr lang="id-ID" sz="1800" kern="1200" dirty="0" smtClean="0">
-                          <a:solidFill>
-                            <a:schemeClr val="dk1"/>
-                          </a:solidFill>
-                          <a:effectLst/>
-                          <a:latin typeface="+mn-lt"/>
-                          <a:ea typeface="+mn-ea"/>
-                          <a:cs typeface="+mn-cs"/>
-                        </a:rPr>
-                        <a:t>Pelanggan tidak yakin bahwa fungsionalitas yang diminta dapat dilakukan.</a:t>
+                      <a:r>
+                        <a:rPr lang="en-US" dirty="0" smtClean="0"/>
+                        <a:t>Tool </a:t>
+                      </a:r>
+                      <a:r>
+                        <a:rPr lang="en-US" dirty="0" err="1" smtClean="0"/>
+                        <a:t>Lainnya</a:t>
+                      </a:r>
+                      <a:endParaRPr lang="en-US" dirty="0"/>
+                    </a:p>
+                  </a:txBody>
+                  <a:tcPr/>
+                </a:tc>
+                <a:tc>
+                  <a:txBody>
+                    <a:bodyPr/>
+                    <a:lstStyle/>
+                    <a:p>
+                      <a:r>
+                        <a:rPr lang="en-US" dirty="0" smtClean="0"/>
+                        <a:t>XAMPP, Apache, </a:t>
+                      </a:r>
+                      <a:r>
+                        <a:rPr lang="en-US" dirty="0" err="1" smtClean="0"/>
+                        <a:t>Git</a:t>
+                      </a:r>
+                      <a:r>
+                        <a:rPr lang="en-US" dirty="0" smtClean="0"/>
+                        <a:t> Bash, Ms.</a:t>
+                      </a:r>
+                      <a:r>
+                        <a:rPr lang="en-US" baseline="0" dirty="0" smtClean="0"/>
+                        <a:t> Project</a:t>
                       </a:r>
                       <a:endParaRPr lang="en-US" dirty="0"/>
                     </a:p>
@@ -8981,7 +9186,7 @@
     </p:spTree>
     <p:extLst>
       <p:ext uri="{BB962C8B-B14F-4D97-AF65-F5344CB8AC3E}">
-        <p14:creationId xmlns:p14="http://schemas.microsoft.com/office/powerpoint/2010/main" val="565765168"/>
+        <p14:creationId xmlns:p14="http://schemas.microsoft.com/office/powerpoint/2010/main" val="71268372"/>
       </p:ext>
     </p:extLst>
   </p:cSld>

</xml_diff>